<commit_message>
updated slides for exercise 13.3
</commit_message>
<xml_diff>
--- a/recitation12/cs1675_rec12_nov30.pptx
+++ b/recitation12/cs1675_rec12_nov30.pptx
@@ -5,7 +5,7 @@
     <p:sldMasterId id="2147483660" r:id="rId1"/>
   </p:sldMasterIdLst>
   <p:notesMasterIdLst>
-    <p:notesMasterId r:id="rId17"/>
+    <p:notesMasterId r:id="rId24"/>
   </p:notesMasterIdLst>
   <p:sldIdLst>
     <p:sldId id="259" r:id="rId2"/>
@@ -23,6 +23,13 @@
     <p:sldId id="271" r:id="rId14"/>
     <p:sldId id="273" r:id="rId15"/>
     <p:sldId id="261" r:id="rId16"/>
+    <p:sldId id="275" r:id="rId17"/>
+    <p:sldId id="276" r:id="rId18"/>
+    <p:sldId id="277" r:id="rId19"/>
+    <p:sldId id="278" r:id="rId20"/>
+    <p:sldId id="279" r:id="rId21"/>
+    <p:sldId id="280" r:id="rId22"/>
+    <p:sldId id="281" r:id="rId23"/>
   </p:sldIdLst>
   <p:sldSz cx="9144000" cy="6858000" type="screen4x3"/>
   <p:notesSz cx="6858000" cy="9144000"/>
@@ -1089,6 +1096,342 @@
 </p:notes>
 </file>
 
+<file path=ppt/notesSlides/notesSlide16.xml><?xml version="1.0" encoding="utf-8"?>
+<p:notes xmlns:a="http://schemas.openxmlformats.org/drawingml/2006/main" xmlns:r="http://schemas.openxmlformats.org/officeDocument/2006/relationships" xmlns:p="http://schemas.openxmlformats.org/presentationml/2006/main">
+  <p:cSld>
+    <p:spTree>
+      <p:nvGrpSpPr>
+        <p:cNvPr id="1" name=""/>
+        <p:cNvGrpSpPr/>
+        <p:nvPr/>
+      </p:nvGrpSpPr>
+      <p:grpSpPr>
+        <a:xfrm>
+          <a:off x="0" y="0"/>
+          <a:ext cx="0" cy="0"/>
+          <a:chOff x="0" y="0"/>
+          <a:chExt cx="0" cy="0"/>
+        </a:xfrm>
+      </p:grpSpPr>
+      <p:sp>
+        <p:nvSpPr>
+          <p:cNvPr id="2" name="Slide Image Placeholder 1"/>
+          <p:cNvSpPr>
+            <a:spLocks noGrp="1" noRot="1" noChangeAspect="1"/>
+          </p:cNvSpPr>
+          <p:nvPr>
+            <p:ph type="sldImg"/>
+          </p:nvPr>
+        </p:nvSpPr>
+        <p:spPr/>
+      </p:sp>
+      <p:sp>
+        <p:nvSpPr>
+          <p:cNvPr id="3" name="Notes Placeholder 2"/>
+          <p:cNvSpPr>
+            <a:spLocks noGrp="1"/>
+          </p:cNvSpPr>
+          <p:nvPr>
+            <p:ph type="body" idx="1"/>
+          </p:nvPr>
+        </p:nvSpPr>
+        <p:spPr/>
+        <p:txBody>
+          <a:bodyPr/>
+          <a:lstStyle/>
+          <a:p>
+            <a:endParaRPr lang="en-US" dirty="0"/>
+          </a:p>
+        </p:txBody>
+      </p:sp>
+      <p:sp>
+        <p:nvSpPr>
+          <p:cNvPr id="4" name="Slide Number Placeholder 3"/>
+          <p:cNvSpPr>
+            <a:spLocks noGrp="1"/>
+          </p:cNvSpPr>
+          <p:nvPr>
+            <p:ph type="sldNum" sz="quarter" idx="5"/>
+          </p:nvPr>
+        </p:nvSpPr>
+        <p:spPr/>
+        <p:txBody>
+          <a:bodyPr/>
+          <a:lstStyle/>
+          <a:p>
+            <a:fld id="{EFAF9F6D-6F5B-4492-B20A-F0EFDC100956}" type="slidenum">
+              <a:rPr lang="en-US" smtClean="0"/>
+              <a:t>16</a:t>
+            </a:fld>
+            <a:endParaRPr lang="en-US"/>
+          </a:p>
+        </p:txBody>
+      </p:sp>
+    </p:spTree>
+    <p:extLst>
+      <p:ext uri="{BB962C8B-B14F-4D97-AF65-F5344CB8AC3E}">
+        <p14:creationId xmlns:p14="http://schemas.microsoft.com/office/powerpoint/2010/main" val="1510784491"/>
+      </p:ext>
+    </p:extLst>
+  </p:cSld>
+  <p:clrMapOvr>
+    <a:masterClrMapping/>
+  </p:clrMapOvr>
+</p:notes>
+</file>
+
+<file path=ppt/notesSlides/notesSlide17.xml><?xml version="1.0" encoding="utf-8"?>
+<p:notes xmlns:a="http://schemas.openxmlformats.org/drawingml/2006/main" xmlns:r="http://schemas.openxmlformats.org/officeDocument/2006/relationships" xmlns:p="http://schemas.openxmlformats.org/presentationml/2006/main">
+  <p:cSld>
+    <p:spTree>
+      <p:nvGrpSpPr>
+        <p:cNvPr id="1" name=""/>
+        <p:cNvGrpSpPr/>
+        <p:nvPr/>
+      </p:nvGrpSpPr>
+      <p:grpSpPr>
+        <a:xfrm>
+          <a:off x="0" y="0"/>
+          <a:ext cx="0" cy="0"/>
+          <a:chOff x="0" y="0"/>
+          <a:chExt cx="0" cy="0"/>
+        </a:xfrm>
+      </p:grpSpPr>
+      <p:sp>
+        <p:nvSpPr>
+          <p:cNvPr id="2" name="Slide Image Placeholder 1"/>
+          <p:cNvSpPr>
+            <a:spLocks noGrp="1" noRot="1" noChangeAspect="1"/>
+          </p:cNvSpPr>
+          <p:nvPr>
+            <p:ph type="sldImg"/>
+          </p:nvPr>
+        </p:nvSpPr>
+        <p:spPr/>
+      </p:sp>
+      <p:sp>
+        <p:nvSpPr>
+          <p:cNvPr id="3" name="Notes Placeholder 2"/>
+          <p:cNvSpPr>
+            <a:spLocks noGrp="1"/>
+          </p:cNvSpPr>
+          <p:nvPr>
+            <p:ph type="body" idx="1"/>
+          </p:nvPr>
+        </p:nvSpPr>
+        <p:spPr/>
+        <p:txBody>
+          <a:bodyPr/>
+          <a:lstStyle/>
+          <a:p>
+            <a:endParaRPr lang="en-US" dirty="0"/>
+          </a:p>
+        </p:txBody>
+      </p:sp>
+      <p:sp>
+        <p:nvSpPr>
+          <p:cNvPr id="4" name="Slide Number Placeholder 3"/>
+          <p:cNvSpPr>
+            <a:spLocks noGrp="1"/>
+          </p:cNvSpPr>
+          <p:nvPr>
+            <p:ph type="sldNum" sz="quarter" idx="5"/>
+          </p:nvPr>
+        </p:nvSpPr>
+        <p:spPr/>
+        <p:txBody>
+          <a:bodyPr/>
+          <a:lstStyle/>
+          <a:p>
+            <a:fld id="{EFAF9F6D-6F5B-4492-B20A-F0EFDC100956}" type="slidenum">
+              <a:rPr lang="en-US" smtClean="0"/>
+              <a:t>17</a:t>
+            </a:fld>
+            <a:endParaRPr lang="en-US"/>
+          </a:p>
+        </p:txBody>
+      </p:sp>
+    </p:spTree>
+    <p:extLst>
+      <p:ext uri="{BB962C8B-B14F-4D97-AF65-F5344CB8AC3E}">
+        <p14:creationId xmlns:p14="http://schemas.microsoft.com/office/powerpoint/2010/main" val="732248061"/>
+      </p:ext>
+    </p:extLst>
+  </p:cSld>
+  <p:clrMapOvr>
+    <a:masterClrMapping/>
+  </p:clrMapOvr>
+</p:notes>
+</file>
+
+<file path=ppt/notesSlides/notesSlide18.xml><?xml version="1.0" encoding="utf-8"?>
+<p:notes xmlns:a="http://schemas.openxmlformats.org/drawingml/2006/main" xmlns:r="http://schemas.openxmlformats.org/officeDocument/2006/relationships" xmlns:p="http://schemas.openxmlformats.org/presentationml/2006/main">
+  <p:cSld>
+    <p:spTree>
+      <p:nvGrpSpPr>
+        <p:cNvPr id="1" name=""/>
+        <p:cNvGrpSpPr/>
+        <p:nvPr/>
+      </p:nvGrpSpPr>
+      <p:grpSpPr>
+        <a:xfrm>
+          <a:off x="0" y="0"/>
+          <a:ext cx="0" cy="0"/>
+          <a:chOff x="0" y="0"/>
+          <a:chExt cx="0" cy="0"/>
+        </a:xfrm>
+      </p:grpSpPr>
+      <p:sp>
+        <p:nvSpPr>
+          <p:cNvPr id="2" name="Slide Image Placeholder 1"/>
+          <p:cNvSpPr>
+            <a:spLocks noGrp="1" noRot="1" noChangeAspect="1"/>
+          </p:cNvSpPr>
+          <p:nvPr>
+            <p:ph type="sldImg"/>
+          </p:nvPr>
+        </p:nvSpPr>
+        <p:spPr/>
+      </p:sp>
+      <p:sp>
+        <p:nvSpPr>
+          <p:cNvPr id="3" name="Notes Placeholder 2"/>
+          <p:cNvSpPr>
+            <a:spLocks noGrp="1"/>
+          </p:cNvSpPr>
+          <p:nvPr>
+            <p:ph type="body" idx="1"/>
+          </p:nvPr>
+        </p:nvSpPr>
+        <p:spPr/>
+        <p:txBody>
+          <a:bodyPr/>
+          <a:lstStyle/>
+          <a:p>
+            <a:endParaRPr lang="en-US" dirty="0"/>
+          </a:p>
+        </p:txBody>
+      </p:sp>
+      <p:sp>
+        <p:nvSpPr>
+          <p:cNvPr id="4" name="Slide Number Placeholder 3"/>
+          <p:cNvSpPr>
+            <a:spLocks noGrp="1"/>
+          </p:cNvSpPr>
+          <p:nvPr>
+            <p:ph type="sldNum" sz="quarter" idx="5"/>
+          </p:nvPr>
+        </p:nvSpPr>
+        <p:spPr/>
+        <p:txBody>
+          <a:bodyPr/>
+          <a:lstStyle/>
+          <a:p>
+            <a:fld id="{EFAF9F6D-6F5B-4492-B20A-F0EFDC100956}" type="slidenum">
+              <a:rPr lang="en-US" smtClean="0"/>
+              <a:t>18</a:t>
+            </a:fld>
+            <a:endParaRPr lang="en-US"/>
+          </a:p>
+        </p:txBody>
+      </p:sp>
+    </p:spTree>
+    <p:extLst>
+      <p:ext uri="{BB962C8B-B14F-4D97-AF65-F5344CB8AC3E}">
+        <p14:creationId xmlns:p14="http://schemas.microsoft.com/office/powerpoint/2010/main" val="3159460520"/>
+      </p:ext>
+    </p:extLst>
+  </p:cSld>
+  <p:clrMapOvr>
+    <a:masterClrMapping/>
+  </p:clrMapOvr>
+</p:notes>
+</file>
+
+<file path=ppt/notesSlides/notesSlide19.xml><?xml version="1.0" encoding="utf-8"?>
+<p:notes xmlns:a="http://schemas.openxmlformats.org/drawingml/2006/main" xmlns:r="http://schemas.openxmlformats.org/officeDocument/2006/relationships" xmlns:p="http://schemas.openxmlformats.org/presentationml/2006/main">
+  <p:cSld>
+    <p:spTree>
+      <p:nvGrpSpPr>
+        <p:cNvPr id="1" name=""/>
+        <p:cNvGrpSpPr/>
+        <p:nvPr/>
+      </p:nvGrpSpPr>
+      <p:grpSpPr>
+        <a:xfrm>
+          <a:off x="0" y="0"/>
+          <a:ext cx="0" cy="0"/>
+          <a:chOff x="0" y="0"/>
+          <a:chExt cx="0" cy="0"/>
+        </a:xfrm>
+      </p:grpSpPr>
+      <p:sp>
+        <p:nvSpPr>
+          <p:cNvPr id="2" name="Slide Image Placeholder 1"/>
+          <p:cNvSpPr>
+            <a:spLocks noGrp="1" noRot="1" noChangeAspect="1"/>
+          </p:cNvSpPr>
+          <p:nvPr>
+            <p:ph type="sldImg"/>
+          </p:nvPr>
+        </p:nvSpPr>
+        <p:spPr/>
+      </p:sp>
+      <p:sp>
+        <p:nvSpPr>
+          <p:cNvPr id="3" name="Notes Placeholder 2"/>
+          <p:cNvSpPr>
+            <a:spLocks noGrp="1"/>
+          </p:cNvSpPr>
+          <p:nvPr>
+            <p:ph type="body" idx="1"/>
+          </p:nvPr>
+        </p:nvSpPr>
+        <p:spPr/>
+        <p:txBody>
+          <a:bodyPr/>
+          <a:lstStyle/>
+          <a:p>
+            <a:endParaRPr lang="en-US" dirty="0"/>
+          </a:p>
+        </p:txBody>
+      </p:sp>
+      <p:sp>
+        <p:nvSpPr>
+          <p:cNvPr id="4" name="Slide Number Placeholder 3"/>
+          <p:cNvSpPr>
+            <a:spLocks noGrp="1"/>
+          </p:cNvSpPr>
+          <p:nvPr>
+            <p:ph type="sldNum" sz="quarter" idx="5"/>
+          </p:nvPr>
+        </p:nvSpPr>
+        <p:spPr/>
+        <p:txBody>
+          <a:bodyPr/>
+          <a:lstStyle/>
+          <a:p>
+            <a:fld id="{EFAF9F6D-6F5B-4492-B20A-F0EFDC100956}" type="slidenum">
+              <a:rPr lang="en-US" smtClean="0"/>
+              <a:t>19</a:t>
+            </a:fld>
+            <a:endParaRPr lang="en-US"/>
+          </a:p>
+        </p:txBody>
+      </p:sp>
+    </p:spTree>
+    <p:extLst>
+      <p:ext uri="{BB962C8B-B14F-4D97-AF65-F5344CB8AC3E}">
+        <p14:creationId xmlns:p14="http://schemas.microsoft.com/office/powerpoint/2010/main" val="1142418489"/>
+      </p:ext>
+    </p:extLst>
+  </p:cSld>
+  <p:clrMapOvr>
+    <a:masterClrMapping/>
+  </p:clrMapOvr>
+</p:notes>
+</file>
+
 <file path=ppt/notesSlides/notesSlide2.xml><?xml version="1.0" encoding="utf-8"?>
 <p:notes xmlns:a="http://schemas.openxmlformats.org/drawingml/2006/main" xmlns:r="http://schemas.openxmlformats.org/officeDocument/2006/relationships" xmlns:p="http://schemas.openxmlformats.org/presentationml/2006/main">
   <p:cSld>
@@ -1167,6 +1510,258 @@
     <p:extLst>
       <p:ext uri="{BB962C8B-B14F-4D97-AF65-F5344CB8AC3E}">
         <p14:creationId xmlns:p14="http://schemas.microsoft.com/office/powerpoint/2010/main" val="3902943437"/>
+      </p:ext>
+    </p:extLst>
+  </p:cSld>
+  <p:clrMapOvr>
+    <a:masterClrMapping/>
+  </p:clrMapOvr>
+</p:notes>
+</file>
+
+<file path=ppt/notesSlides/notesSlide20.xml><?xml version="1.0" encoding="utf-8"?>
+<p:notes xmlns:a="http://schemas.openxmlformats.org/drawingml/2006/main" xmlns:r="http://schemas.openxmlformats.org/officeDocument/2006/relationships" xmlns:p="http://schemas.openxmlformats.org/presentationml/2006/main">
+  <p:cSld>
+    <p:spTree>
+      <p:nvGrpSpPr>
+        <p:cNvPr id="1" name=""/>
+        <p:cNvGrpSpPr/>
+        <p:nvPr/>
+      </p:nvGrpSpPr>
+      <p:grpSpPr>
+        <a:xfrm>
+          <a:off x="0" y="0"/>
+          <a:ext cx="0" cy="0"/>
+          <a:chOff x="0" y="0"/>
+          <a:chExt cx="0" cy="0"/>
+        </a:xfrm>
+      </p:grpSpPr>
+      <p:sp>
+        <p:nvSpPr>
+          <p:cNvPr id="2" name="Slide Image Placeholder 1"/>
+          <p:cNvSpPr>
+            <a:spLocks noGrp="1" noRot="1" noChangeAspect="1"/>
+          </p:cNvSpPr>
+          <p:nvPr>
+            <p:ph type="sldImg"/>
+          </p:nvPr>
+        </p:nvSpPr>
+        <p:spPr/>
+      </p:sp>
+      <p:sp>
+        <p:nvSpPr>
+          <p:cNvPr id="3" name="Notes Placeholder 2"/>
+          <p:cNvSpPr>
+            <a:spLocks noGrp="1"/>
+          </p:cNvSpPr>
+          <p:nvPr>
+            <p:ph type="body" idx="1"/>
+          </p:nvPr>
+        </p:nvSpPr>
+        <p:spPr/>
+        <p:txBody>
+          <a:bodyPr/>
+          <a:lstStyle/>
+          <a:p>
+            <a:endParaRPr lang="en-US" dirty="0"/>
+          </a:p>
+        </p:txBody>
+      </p:sp>
+      <p:sp>
+        <p:nvSpPr>
+          <p:cNvPr id="4" name="Slide Number Placeholder 3"/>
+          <p:cNvSpPr>
+            <a:spLocks noGrp="1"/>
+          </p:cNvSpPr>
+          <p:nvPr>
+            <p:ph type="sldNum" sz="quarter" idx="5"/>
+          </p:nvPr>
+        </p:nvSpPr>
+        <p:spPr/>
+        <p:txBody>
+          <a:bodyPr/>
+          <a:lstStyle/>
+          <a:p>
+            <a:fld id="{EFAF9F6D-6F5B-4492-B20A-F0EFDC100956}" type="slidenum">
+              <a:rPr lang="en-US" smtClean="0"/>
+              <a:t>20</a:t>
+            </a:fld>
+            <a:endParaRPr lang="en-US"/>
+          </a:p>
+        </p:txBody>
+      </p:sp>
+    </p:spTree>
+    <p:extLst>
+      <p:ext uri="{BB962C8B-B14F-4D97-AF65-F5344CB8AC3E}">
+        <p14:creationId xmlns:p14="http://schemas.microsoft.com/office/powerpoint/2010/main" val="3928646186"/>
+      </p:ext>
+    </p:extLst>
+  </p:cSld>
+  <p:clrMapOvr>
+    <a:masterClrMapping/>
+  </p:clrMapOvr>
+</p:notes>
+</file>
+
+<file path=ppt/notesSlides/notesSlide21.xml><?xml version="1.0" encoding="utf-8"?>
+<p:notes xmlns:a="http://schemas.openxmlformats.org/drawingml/2006/main" xmlns:r="http://schemas.openxmlformats.org/officeDocument/2006/relationships" xmlns:p="http://schemas.openxmlformats.org/presentationml/2006/main">
+  <p:cSld>
+    <p:spTree>
+      <p:nvGrpSpPr>
+        <p:cNvPr id="1" name=""/>
+        <p:cNvGrpSpPr/>
+        <p:nvPr/>
+      </p:nvGrpSpPr>
+      <p:grpSpPr>
+        <a:xfrm>
+          <a:off x="0" y="0"/>
+          <a:ext cx="0" cy="0"/>
+          <a:chOff x="0" y="0"/>
+          <a:chExt cx="0" cy="0"/>
+        </a:xfrm>
+      </p:grpSpPr>
+      <p:sp>
+        <p:nvSpPr>
+          <p:cNvPr id="2" name="Slide Image Placeholder 1"/>
+          <p:cNvSpPr>
+            <a:spLocks noGrp="1" noRot="1" noChangeAspect="1"/>
+          </p:cNvSpPr>
+          <p:nvPr>
+            <p:ph type="sldImg"/>
+          </p:nvPr>
+        </p:nvSpPr>
+        <p:spPr/>
+      </p:sp>
+      <p:sp>
+        <p:nvSpPr>
+          <p:cNvPr id="3" name="Notes Placeholder 2"/>
+          <p:cNvSpPr>
+            <a:spLocks noGrp="1"/>
+          </p:cNvSpPr>
+          <p:nvPr>
+            <p:ph type="body" idx="1"/>
+          </p:nvPr>
+        </p:nvSpPr>
+        <p:spPr/>
+        <p:txBody>
+          <a:bodyPr/>
+          <a:lstStyle/>
+          <a:p>
+            <a:endParaRPr lang="en-US" dirty="0"/>
+          </a:p>
+        </p:txBody>
+      </p:sp>
+      <p:sp>
+        <p:nvSpPr>
+          <p:cNvPr id="4" name="Slide Number Placeholder 3"/>
+          <p:cNvSpPr>
+            <a:spLocks noGrp="1"/>
+          </p:cNvSpPr>
+          <p:nvPr>
+            <p:ph type="sldNum" sz="quarter" idx="5"/>
+          </p:nvPr>
+        </p:nvSpPr>
+        <p:spPr/>
+        <p:txBody>
+          <a:bodyPr/>
+          <a:lstStyle/>
+          <a:p>
+            <a:fld id="{EFAF9F6D-6F5B-4492-B20A-F0EFDC100956}" type="slidenum">
+              <a:rPr lang="en-US" smtClean="0"/>
+              <a:t>21</a:t>
+            </a:fld>
+            <a:endParaRPr lang="en-US"/>
+          </a:p>
+        </p:txBody>
+      </p:sp>
+    </p:spTree>
+    <p:extLst>
+      <p:ext uri="{BB962C8B-B14F-4D97-AF65-F5344CB8AC3E}">
+        <p14:creationId xmlns:p14="http://schemas.microsoft.com/office/powerpoint/2010/main" val="3094714736"/>
+      </p:ext>
+    </p:extLst>
+  </p:cSld>
+  <p:clrMapOvr>
+    <a:masterClrMapping/>
+  </p:clrMapOvr>
+</p:notes>
+</file>
+
+<file path=ppt/notesSlides/notesSlide22.xml><?xml version="1.0" encoding="utf-8"?>
+<p:notes xmlns:a="http://schemas.openxmlformats.org/drawingml/2006/main" xmlns:r="http://schemas.openxmlformats.org/officeDocument/2006/relationships" xmlns:p="http://schemas.openxmlformats.org/presentationml/2006/main">
+  <p:cSld>
+    <p:spTree>
+      <p:nvGrpSpPr>
+        <p:cNvPr id="1" name=""/>
+        <p:cNvGrpSpPr/>
+        <p:nvPr/>
+      </p:nvGrpSpPr>
+      <p:grpSpPr>
+        <a:xfrm>
+          <a:off x="0" y="0"/>
+          <a:ext cx="0" cy="0"/>
+          <a:chOff x="0" y="0"/>
+          <a:chExt cx="0" cy="0"/>
+        </a:xfrm>
+      </p:grpSpPr>
+      <p:sp>
+        <p:nvSpPr>
+          <p:cNvPr id="2" name="Slide Image Placeholder 1"/>
+          <p:cNvSpPr>
+            <a:spLocks noGrp="1" noRot="1" noChangeAspect="1"/>
+          </p:cNvSpPr>
+          <p:nvPr>
+            <p:ph type="sldImg"/>
+          </p:nvPr>
+        </p:nvSpPr>
+        <p:spPr/>
+      </p:sp>
+      <p:sp>
+        <p:nvSpPr>
+          <p:cNvPr id="3" name="Notes Placeholder 2"/>
+          <p:cNvSpPr>
+            <a:spLocks noGrp="1"/>
+          </p:cNvSpPr>
+          <p:nvPr>
+            <p:ph type="body" idx="1"/>
+          </p:nvPr>
+        </p:nvSpPr>
+        <p:spPr/>
+        <p:txBody>
+          <a:bodyPr/>
+          <a:lstStyle/>
+          <a:p>
+            <a:endParaRPr lang="en-US" dirty="0"/>
+          </a:p>
+        </p:txBody>
+      </p:sp>
+      <p:sp>
+        <p:nvSpPr>
+          <p:cNvPr id="4" name="Slide Number Placeholder 3"/>
+          <p:cNvSpPr>
+            <a:spLocks noGrp="1"/>
+          </p:cNvSpPr>
+          <p:nvPr>
+            <p:ph type="sldNum" sz="quarter" idx="5"/>
+          </p:nvPr>
+        </p:nvSpPr>
+        <p:spPr/>
+        <p:txBody>
+          <a:bodyPr/>
+          <a:lstStyle/>
+          <a:p>
+            <a:fld id="{EFAF9F6D-6F5B-4492-B20A-F0EFDC100956}" type="slidenum">
+              <a:rPr lang="en-US" smtClean="0"/>
+              <a:t>22</a:t>
+            </a:fld>
+            <a:endParaRPr lang="en-US"/>
+          </a:p>
+        </p:txBody>
+      </p:sp>
+    </p:spTree>
+    <p:extLst>
+      <p:ext uri="{BB962C8B-B14F-4D97-AF65-F5344CB8AC3E}">
+        <p14:creationId xmlns:p14="http://schemas.microsoft.com/office/powerpoint/2010/main" val="878922295"/>
       </p:ext>
     </p:extLst>
   </p:cSld>
@@ -4746,20 +5341,8 @@
               <a:buAutoNum type="arabicPeriod"/>
             </a:pPr>
             <a:r>
-              <a:rPr lang="en-US" sz="2300" i="1" dirty="0"/>
+              <a:rPr lang="en-US" sz="2300" i="1" dirty="0" smtClean="0"/>
               <a:t>13.3</a:t>
-            </a:r>
-            <a:r>
-              <a:rPr lang="en-US" sz="2300" dirty="0"/>
-              <a:t> </a:t>
-            </a:r>
-            <a:r>
-              <a:rPr lang="en-US" sz="2300" dirty="0">
-                <a:solidFill>
-                  <a:srgbClr val="FF0000"/>
-                </a:solidFill>
-              </a:rPr>
-              <a:t>check back later</a:t>
             </a:r>
             <a:endParaRPr lang="en-US" sz="2300" i="1" dirty="0"/>
           </a:p>
@@ -4815,7 +5398,7 @@
           <p:cNvPr id="2" name="TextBox 1">
             <a:extLst>
               <a:ext uri="{FF2B5EF4-FFF2-40B4-BE49-F238E27FC236}">
-                <a16:creationId xmlns:a16="http://schemas.microsoft.com/office/drawing/2014/main" id="{6A64C7F4-FA5C-4814-A23C-76367B7D30DD}"/>
+                <a16:creationId xmlns:a16="http://schemas.microsoft.com/office/drawing/2014/main" xmlns="" id="{6A64C7F4-FA5C-4814-A23C-76367B7D30DD}"/>
               </a:ext>
             </a:extLst>
           </p:cNvPr>
@@ -4856,6 +5439,13 @@
   <p:clrMapOvr>
     <a:masterClrMapping/>
   </p:clrMapOvr>
+  <p:timing>
+    <p:tnLst>
+      <p:par>
+        <p:cTn id="1" dur="indefinite" restart="never" nodeType="tmRoot"/>
+      </p:par>
+    </p:tnLst>
+  </p:timing>
 </p:sld>
 </file>
 
@@ -4913,7 +5503,7 @@
           <p:cNvPr id="4" name="Group 3">
             <a:extLst>
               <a:ext uri="{FF2B5EF4-FFF2-40B4-BE49-F238E27FC236}">
-                <a16:creationId xmlns:a16="http://schemas.microsoft.com/office/drawing/2014/main" id="{C71A3E6D-0157-4DAF-A8F2-241A14AA152B}"/>
+                <a16:creationId xmlns:a16="http://schemas.microsoft.com/office/drawing/2014/main" xmlns="" id="{C71A3E6D-0157-4DAF-A8F2-241A14AA152B}"/>
               </a:ext>
             </a:extLst>
           </p:cNvPr>
@@ -4935,7 +5525,7 @@
             <p:cNvPr id="2" name="Picture 1">
               <a:extLst>
                 <a:ext uri="{FF2B5EF4-FFF2-40B4-BE49-F238E27FC236}">
-                  <a16:creationId xmlns:a16="http://schemas.microsoft.com/office/drawing/2014/main" id="{305B949B-C650-4047-90B4-B66F1D3C10A2}"/>
+                  <a16:creationId xmlns:a16="http://schemas.microsoft.com/office/drawing/2014/main" xmlns="" id="{305B949B-C650-4047-90B4-B66F1D3C10A2}"/>
                 </a:ext>
               </a:extLst>
             </p:cNvPr>
@@ -4965,7 +5555,7 @@
             <p:cNvPr id="3" name="Rectangle 2">
               <a:extLst>
                 <a:ext uri="{FF2B5EF4-FFF2-40B4-BE49-F238E27FC236}">
-                  <a16:creationId xmlns:a16="http://schemas.microsoft.com/office/drawing/2014/main" id="{227E6115-1B67-4E71-A976-B2176D4D1AD2}"/>
+                  <a16:creationId xmlns:a16="http://schemas.microsoft.com/office/drawing/2014/main" xmlns="" id="{227E6115-1B67-4E71-A976-B2176D4D1AD2}"/>
                 </a:ext>
               </a:extLst>
             </p:cNvPr>
@@ -5020,7 +5610,7 @@
           <p:cNvPr id="7" name="Picture 6">
             <a:extLst>
               <a:ext uri="{FF2B5EF4-FFF2-40B4-BE49-F238E27FC236}">
-                <a16:creationId xmlns:a16="http://schemas.microsoft.com/office/drawing/2014/main" id="{4A2CFD22-0826-49FD-8F64-F8839545912F}"/>
+                <a16:creationId xmlns:a16="http://schemas.microsoft.com/office/drawing/2014/main" xmlns="" id="{4A2CFD22-0826-49FD-8F64-F8839545912F}"/>
               </a:ext>
             </a:extLst>
           </p:cNvPr>
@@ -5050,7 +5640,7 @@
           <p:cNvPr id="8" name="Picture 7">
             <a:extLst>
               <a:ext uri="{FF2B5EF4-FFF2-40B4-BE49-F238E27FC236}">
-                <a16:creationId xmlns:a16="http://schemas.microsoft.com/office/drawing/2014/main" id="{A0EF0FE7-DFFA-434A-A55E-667292EF7F2C}"/>
+                <a16:creationId xmlns:a16="http://schemas.microsoft.com/office/drawing/2014/main" xmlns="" id="{A0EF0FE7-DFFA-434A-A55E-667292EF7F2C}"/>
               </a:ext>
             </a:extLst>
           </p:cNvPr>
@@ -5085,6 +5675,13 @@
   <p:clrMapOvr>
     <a:masterClrMapping/>
   </p:clrMapOvr>
+  <p:timing>
+    <p:tnLst>
+      <p:par>
+        <p:cTn id="1" dur="indefinite" restart="never" nodeType="tmRoot"/>
+      </p:par>
+    </p:tnLst>
+  </p:timing>
 </p:sld>
 </file>
 
@@ -5110,7 +5707,7 @@
           <p:cNvPr id="11" name="Picture 10">
             <a:extLst>
               <a:ext uri="{FF2B5EF4-FFF2-40B4-BE49-F238E27FC236}">
-                <a16:creationId xmlns:a16="http://schemas.microsoft.com/office/drawing/2014/main" id="{63695A45-FCE4-4B35-8C38-43C79E434C20}"/>
+                <a16:creationId xmlns:a16="http://schemas.microsoft.com/office/drawing/2014/main" xmlns="" id="{63695A45-FCE4-4B35-8C38-43C79E434C20}"/>
               </a:ext>
             </a:extLst>
           </p:cNvPr>
@@ -5172,7 +5769,7 @@
           <p:cNvPr id="4" name="Group 3">
             <a:extLst>
               <a:ext uri="{FF2B5EF4-FFF2-40B4-BE49-F238E27FC236}">
-                <a16:creationId xmlns:a16="http://schemas.microsoft.com/office/drawing/2014/main" id="{C71A3E6D-0157-4DAF-A8F2-241A14AA152B}"/>
+                <a16:creationId xmlns:a16="http://schemas.microsoft.com/office/drawing/2014/main" xmlns="" id="{C71A3E6D-0157-4DAF-A8F2-241A14AA152B}"/>
               </a:ext>
             </a:extLst>
           </p:cNvPr>
@@ -5194,7 +5791,7 @@
             <p:cNvPr id="2" name="Picture 1">
               <a:extLst>
                 <a:ext uri="{FF2B5EF4-FFF2-40B4-BE49-F238E27FC236}">
-                  <a16:creationId xmlns:a16="http://schemas.microsoft.com/office/drawing/2014/main" id="{305B949B-C650-4047-90B4-B66F1D3C10A2}"/>
+                  <a16:creationId xmlns:a16="http://schemas.microsoft.com/office/drawing/2014/main" xmlns="" id="{305B949B-C650-4047-90B4-B66F1D3C10A2}"/>
                 </a:ext>
               </a:extLst>
             </p:cNvPr>
@@ -5223,7 +5820,7 @@
             <p:cNvPr id="3" name="Rectangle 2">
               <a:extLst>
                 <a:ext uri="{FF2B5EF4-FFF2-40B4-BE49-F238E27FC236}">
-                  <a16:creationId xmlns:a16="http://schemas.microsoft.com/office/drawing/2014/main" id="{227E6115-1B67-4E71-A976-B2176D4D1AD2}"/>
+                  <a16:creationId xmlns:a16="http://schemas.microsoft.com/office/drawing/2014/main" xmlns="" id="{227E6115-1B67-4E71-A976-B2176D4D1AD2}"/>
                 </a:ext>
               </a:extLst>
             </p:cNvPr>
@@ -5278,7 +5875,7 @@
           <p:cNvPr id="10" name="Picture 9">
             <a:extLst>
               <a:ext uri="{FF2B5EF4-FFF2-40B4-BE49-F238E27FC236}">
-                <a16:creationId xmlns:a16="http://schemas.microsoft.com/office/drawing/2014/main" id="{C6533B0D-D284-4DD3-B2ED-FB1D5F5E960B}"/>
+                <a16:creationId xmlns:a16="http://schemas.microsoft.com/office/drawing/2014/main" xmlns="" id="{C6533B0D-D284-4DD3-B2ED-FB1D5F5E960B}"/>
               </a:ext>
             </a:extLst>
           </p:cNvPr>
@@ -5315,7 +5912,7 @@
           <p:cNvPr id="13" name="Straight Connector 12">
             <a:extLst>
               <a:ext uri="{FF2B5EF4-FFF2-40B4-BE49-F238E27FC236}">
-                <a16:creationId xmlns:a16="http://schemas.microsoft.com/office/drawing/2014/main" id="{D40CD704-C4D8-4214-9FCA-B56090149A3C}"/>
+                <a16:creationId xmlns:a16="http://schemas.microsoft.com/office/drawing/2014/main" xmlns="" id="{D40CD704-C4D8-4214-9FCA-B56090149A3C}"/>
               </a:ext>
             </a:extLst>
           </p:cNvPr>
@@ -5351,7 +5948,7 @@
           <p:cNvPr id="14" name="Straight Connector 13">
             <a:extLst>
               <a:ext uri="{FF2B5EF4-FFF2-40B4-BE49-F238E27FC236}">
-                <a16:creationId xmlns:a16="http://schemas.microsoft.com/office/drawing/2014/main" id="{A6F8EC2E-3C49-4D3F-B6A9-BD4AE57AAE8B}"/>
+                <a16:creationId xmlns:a16="http://schemas.microsoft.com/office/drawing/2014/main" xmlns="" id="{A6F8EC2E-3C49-4D3F-B6A9-BD4AE57AAE8B}"/>
               </a:ext>
             </a:extLst>
           </p:cNvPr>
@@ -5389,7 +5986,7 @@
           <p:cNvPr id="16" name="Picture 15">
             <a:extLst>
               <a:ext uri="{FF2B5EF4-FFF2-40B4-BE49-F238E27FC236}">
-                <a16:creationId xmlns:a16="http://schemas.microsoft.com/office/drawing/2014/main" id="{1BE800EB-C3A4-433C-B2EF-3F8B6643EE37}"/>
+                <a16:creationId xmlns:a16="http://schemas.microsoft.com/office/drawing/2014/main" xmlns="" id="{1BE800EB-C3A4-433C-B2EF-3F8B6643EE37}"/>
               </a:ext>
             </a:extLst>
           </p:cNvPr>
@@ -5419,7 +6016,7 @@
           <p:cNvPr id="17" name="TextBox 16">
             <a:extLst>
               <a:ext uri="{FF2B5EF4-FFF2-40B4-BE49-F238E27FC236}">
-                <a16:creationId xmlns:a16="http://schemas.microsoft.com/office/drawing/2014/main" id="{C5911EDE-F2E9-4F03-AB8E-83613B3CA7DB}"/>
+                <a16:creationId xmlns:a16="http://schemas.microsoft.com/office/drawing/2014/main" xmlns="" id="{C5911EDE-F2E9-4F03-AB8E-83613B3CA7DB}"/>
               </a:ext>
             </a:extLst>
           </p:cNvPr>
@@ -5459,6 +6056,13 @@
   <p:clrMapOvr>
     <a:masterClrMapping/>
   </p:clrMapOvr>
+  <p:timing>
+    <p:tnLst>
+      <p:par>
+        <p:cTn id="1" dur="indefinite" restart="never" nodeType="tmRoot"/>
+      </p:par>
+    </p:tnLst>
+  </p:timing>
 </p:sld>
 </file>
 
@@ -5516,7 +6120,7 @@
           <p:cNvPr id="3" name="Rectangle 2">
             <a:extLst>
               <a:ext uri="{FF2B5EF4-FFF2-40B4-BE49-F238E27FC236}">
-                <a16:creationId xmlns:a16="http://schemas.microsoft.com/office/drawing/2014/main" id="{227E6115-1B67-4E71-A976-B2176D4D1AD2}"/>
+                <a16:creationId xmlns:a16="http://schemas.microsoft.com/office/drawing/2014/main" xmlns="" id="{227E6115-1B67-4E71-A976-B2176D4D1AD2}"/>
               </a:ext>
             </a:extLst>
           </p:cNvPr>
@@ -5570,7 +6174,7 @@
           <p:cNvPr id="10" name="Picture 9">
             <a:extLst>
               <a:ext uri="{FF2B5EF4-FFF2-40B4-BE49-F238E27FC236}">
-                <a16:creationId xmlns:a16="http://schemas.microsoft.com/office/drawing/2014/main" id="{C6533B0D-D284-4DD3-B2ED-FB1D5F5E960B}"/>
+                <a16:creationId xmlns:a16="http://schemas.microsoft.com/office/drawing/2014/main" xmlns="" id="{C6533B0D-D284-4DD3-B2ED-FB1D5F5E960B}"/>
               </a:ext>
             </a:extLst>
           </p:cNvPr>
@@ -5607,7 +6211,7 @@
           <p:cNvPr id="8" name="Picture 7">
             <a:extLst>
               <a:ext uri="{FF2B5EF4-FFF2-40B4-BE49-F238E27FC236}">
-                <a16:creationId xmlns:a16="http://schemas.microsoft.com/office/drawing/2014/main" id="{0E874BF6-4D65-4B6F-A0B8-A23EB82E7EC5}"/>
+                <a16:creationId xmlns:a16="http://schemas.microsoft.com/office/drawing/2014/main" xmlns="" id="{0E874BF6-4D65-4B6F-A0B8-A23EB82E7EC5}"/>
               </a:ext>
             </a:extLst>
           </p:cNvPr>
@@ -5637,7 +6241,7 @@
           <p:cNvPr id="15" name="TextBox 14">
             <a:extLst>
               <a:ext uri="{FF2B5EF4-FFF2-40B4-BE49-F238E27FC236}">
-                <a16:creationId xmlns:a16="http://schemas.microsoft.com/office/drawing/2014/main" id="{A40D5305-EB9A-4649-A2BC-CC608CC92E6C}"/>
+                <a16:creationId xmlns:a16="http://schemas.microsoft.com/office/drawing/2014/main" xmlns="" id="{A40D5305-EB9A-4649-A2BC-CC608CC92E6C}"/>
               </a:ext>
             </a:extLst>
           </p:cNvPr>
@@ -5672,7 +6276,7 @@
           <p:cNvPr id="18" name="TextBox 17">
             <a:extLst>
               <a:ext uri="{FF2B5EF4-FFF2-40B4-BE49-F238E27FC236}">
-                <a16:creationId xmlns:a16="http://schemas.microsoft.com/office/drawing/2014/main" id="{145C9546-D837-477A-A8D5-64773D2E09D9}"/>
+                <a16:creationId xmlns:a16="http://schemas.microsoft.com/office/drawing/2014/main" xmlns="" id="{145C9546-D837-477A-A8D5-64773D2E09D9}"/>
               </a:ext>
             </a:extLst>
           </p:cNvPr>
@@ -5757,7 +6361,7 @@
           <p:cNvPr id="12" name="Picture 11">
             <a:extLst>
               <a:ext uri="{FF2B5EF4-FFF2-40B4-BE49-F238E27FC236}">
-                <a16:creationId xmlns:a16="http://schemas.microsoft.com/office/drawing/2014/main" id="{DDDA1D6E-BACE-440A-AF91-6C5443E7F6EC}"/>
+                <a16:creationId xmlns:a16="http://schemas.microsoft.com/office/drawing/2014/main" xmlns="" id="{DDDA1D6E-BACE-440A-AF91-6C5443E7F6EC}"/>
               </a:ext>
             </a:extLst>
           </p:cNvPr>
@@ -5787,7 +6391,7 @@
           <p:cNvPr id="20" name="TextBox 19">
             <a:extLst>
               <a:ext uri="{FF2B5EF4-FFF2-40B4-BE49-F238E27FC236}">
-                <a16:creationId xmlns:a16="http://schemas.microsoft.com/office/drawing/2014/main" id="{CDB9A45C-5239-4721-A2BF-F2B637A6DFEA}"/>
+                <a16:creationId xmlns:a16="http://schemas.microsoft.com/office/drawing/2014/main" xmlns="" id="{CDB9A45C-5239-4721-A2BF-F2B637A6DFEA}"/>
               </a:ext>
             </a:extLst>
           </p:cNvPr>
@@ -5827,6 +6431,13 @@
   <p:clrMapOvr>
     <a:masterClrMapping/>
   </p:clrMapOvr>
+  <p:timing>
+    <p:tnLst>
+      <p:par>
+        <p:cTn id="1" dur="indefinite" restart="never" nodeType="tmRoot"/>
+      </p:par>
+    </p:tnLst>
+  </p:timing>
 </p:sld>
 </file>
 
@@ -5884,7 +6495,7 @@
           <p:cNvPr id="3" name="Rectangle 2">
             <a:extLst>
               <a:ext uri="{FF2B5EF4-FFF2-40B4-BE49-F238E27FC236}">
-                <a16:creationId xmlns:a16="http://schemas.microsoft.com/office/drawing/2014/main" id="{227E6115-1B67-4E71-A976-B2176D4D1AD2}"/>
+                <a16:creationId xmlns:a16="http://schemas.microsoft.com/office/drawing/2014/main" xmlns="" id="{227E6115-1B67-4E71-A976-B2176D4D1AD2}"/>
               </a:ext>
             </a:extLst>
           </p:cNvPr>
@@ -5938,7 +6549,7 @@
           <p:cNvPr id="8" name="Picture 7">
             <a:extLst>
               <a:ext uri="{FF2B5EF4-FFF2-40B4-BE49-F238E27FC236}">
-                <a16:creationId xmlns:a16="http://schemas.microsoft.com/office/drawing/2014/main" id="{0E874BF6-4D65-4B6F-A0B8-A23EB82E7EC5}"/>
+                <a16:creationId xmlns:a16="http://schemas.microsoft.com/office/drawing/2014/main" xmlns="" id="{0E874BF6-4D65-4B6F-A0B8-A23EB82E7EC5}"/>
               </a:ext>
             </a:extLst>
           </p:cNvPr>
@@ -5968,7 +6579,7 @@
           <p:cNvPr id="15" name="TextBox 14">
             <a:extLst>
               <a:ext uri="{FF2B5EF4-FFF2-40B4-BE49-F238E27FC236}">
-                <a16:creationId xmlns:a16="http://schemas.microsoft.com/office/drawing/2014/main" id="{A40D5305-EB9A-4649-A2BC-CC608CC92E6C}"/>
+                <a16:creationId xmlns:a16="http://schemas.microsoft.com/office/drawing/2014/main" xmlns="" id="{A40D5305-EB9A-4649-A2BC-CC608CC92E6C}"/>
               </a:ext>
             </a:extLst>
           </p:cNvPr>
@@ -6003,7 +6614,7 @@
           <p:cNvPr id="18" name="TextBox 17">
             <a:extLst>
               <a:ext uri="{FF2B5EF4-FFF2-40B4-BE49-F238E27FC236}">
-                <a16:creationId xmlns:a16="http://schemas.microsoft.com/office/drawing/2014/main" id="{145C9546-D837-477A-A8D5-64773D2E09D9}"/>
+                <a16:creationId xmlns:a16="http://schemas.microsoft.com/office/drawing/2014/main" xmlns="" id="{145C9546-D837-477A-A8D5-64773D2E09D9}"/>
               </a:ext>
             </a:extLst>
           </p:cNvPr>
@@ -6056,7 +6667,7 @@
           <p:cNvPr id="4" name="Picture 3">
             <a:extLst>
               <a:ext uri="{FF2B5EF4-FFF2-40B4-BE49-F238E27FC236}">
-                <a16:creationId xmlns:a16="http://schemas.microsoft.com/office/drawing/2014/main" id="{2213F5F5-09B7-4230-9FC0-801735BA5EF5}"/>
+                <a16:creationId xmlns:a16="http://schemas.microsoft.com/office/drawing/2014/main" xmlns="" id="{2213F5F5-09B7-4230-9FC0-801735BA5EF5}"/>
               </a:ext>
             </a:extLst>
           </p:cNvPr>
@@ -6086,7 +6697,7 @@
           <p:cNvPr id="13" name="Picture 12">
             <a:extLst>
               <a:ext uri="{FF2B5EF4-FFF2-40B4-BE49-F238E27FC236}">
-                <a16:creationId xmlns:a16="http://schemas.microsoft.com/office/drawing/2014/main" id="{EF68A345-84A2-4755-B15B-0C847DA0693E}"/>
+                <a16:creationId xmlns:a16="http://schemas.microsoft.com/office/drawing/2014/main" xmlns="" id="{EF68A345-84A2-4755-B15B-0C847DA0693E}"/>
               </a:ext>
             </a:extLst>
           </p:cNvPr>
@@ -6123,7 +6734,7 @@
           <p:cNvPr id="14" name="TextBox 13">
             <a:extLst>
               <a:ext uri="{FF2B5EF4-FFF2-40B4-BE49-F238E27FC236}">
-                <a16:creationId xmlns:a16="http://schemas.microsoft.com/office/drawing/2014/main" id="{39834C05-8509-45F0-A373-EE2FDF631F5B}"/>
+                <a16:creationId xmlns:a16="http://schemas.microsoft.com/office/drawing/2014/main" xmlns="" id="{39834C05-8509-45F0-A373-EE2FDF631F5B}"/>
               </a:ext>
             </a:extLst>
           </p:cNvPr>
@@ -6161,7 +6772,7 @@
           <p:cNvPr id="6" name="Picture 5">
             <a:extLst>
               <a:ext uri="{FF2B5EF4-FFF2-40B4-BE49-F238E27FC236}">
-                <a16:creationId xmlns:a16="http://schemas.microsoft.com/office/drawing/2014/main" id="{3A774A79-5D3E-4FDF-85C6-2927D47F9E4D}"/>
+                <a16:creationId xmlns:a16="http://schemas.microsoft.com/office/drawing/2014/main" xmlns="" id="{3A774A79-5D3E-4FDF-85C6-2927D47F9E4D}"/>
               </a:ext>
             </a:extLst>
           </p:cNvPr>
@@ -6196,6 +6807,13 @@
   <p:clrMapOvr>
     <a:masterClrMapping/>
   </p:clrMapOvr>
+  <p:timing>
+    <p:tnLst>
+      <p:par>
+        <p:cTn id="1" dur="indefinite" restart="never" nodeType="tmRoot"/>
+      </p:par>
+    </p:tnLst>
+  </p:timing>
 </p:sld>
 </file>
 
@@ -6253,7 +6871,7 @@
           <p:cNvPr id="3" name="Rectangle 2">
             <a:extLst>
               <a:ext uri="{FF2B5EF4-FFF2-40B4-BE49-F238E27FC236}">
-                <a16:creationId xmlns:a16="http://schemas.microsoft.com/office/drawing/2014/main" id="{227E6115-1B67-4E71-A976-B2176D4D1AD2}"/>
+                <a16:creationId xmlns:a16="http://schemas.microsoft.com/office/drawing/2014/main" xmlns="" id="{227E6115-1B67-4E71-A976-B2176D4D1AD2}"/>
               </a:ext>
             </a:extLst>
           </p:cNvPr>
@@ -6307,7 +6925,7 @@
           <p:cNvPr id="13" name="Picture 12">
             <a:extLst>
               <a:ext uri="{FF2B5EF4-FFF2-40B4-BE49-F238E27FC236}">
-                <a16:creationId xmlns:a16="http://schemas.microsoft.com/office/drawing/2014/main" id="{EF68A345-84A2-4755-B15B-0C847DA0693E}"/>
+                <a16:creationId xmlns:a16="http://schemas.microsoft.com/office/drawing/2014/main" xmlns="" id="{EF68A345-84A2-4755-B15B-0C847DA0693E}"/>
               </a:ext>
             </a:extLst>
           </p:cNvPr>
@@ -6344,7 +6962,7 @@
           <p:cNvPr id="11" name="Group 10">
             <a:extLst>
               <a:ext uri="{FF2B5EF4-FFF2-40B4-BE49-F238E27FC236}">
-                <a16:creationId xmlns:a16="http://schemas.microsoft.com/office/drawing/2014/main" id="{739509F4-B28F-46CC-A5AE-070A5DCCBB0B}"/>
+                <a16:creationId xmlns:a16="http://schemas.microsoft.com/office/drawing/2014/main" xmlns="" id="{739509F4-B28F-46CC-A5AE-070A5DCCBB0B}"/>
               </a:ext>
             </a:extLst>
           </p:cNvPr>
@@ -6366,7 +6984,7 @@
             <p:cNvPr id="12" name="Picture 11">
               <a:extLst>
                 <a:ext uri="{FF2B5EF4-FFF2-40B4-BE49-F238E27FC236}">
-                  <a16:creationId xmlns:a16="http://schemas.microsoft.com/office/drawing/2014/main" id="{9475E13D-1D2D-4422-A04A-2BA6FA10F228}"/>
+                  <a16:creationId xmlns:a16="http://schemas.microsoft.com/office/drawing/2014/main" xmlns="" id="{9475E13D-1D2D-4422-A04A-2BA6FA10F228}"/>
                 </a:ext>
               </a:extLst>
             </p:cNvPr>
@@ -6395,7 +7013,7 @@
             <p:cNvPr id="16" name="Rectangle 15">
               <a:extLst>
                 <a:ext uri="{FF2B5EF4-FFF2-40B4-BE49-F238E27FC236}">
-                  <a16:creationId xmlns:a16="http://schemas.microsoft.com/office/drawing/2014/main" id="{284AAA2D-F3BD-4D46-B722-2A25E3C0208B}"/>
+                  <a16:creationId xmlns:a16="http://schemas.microsoft.com/office/drawing/2014/main" xmlns="" id="{284AAA2D-F3BD-4D46-B722-2A25E3C0208B}"/>
                 </a:ext>
               </a:extLst>
             </p:cNvPr>
@@ -6450,7 +7068,7 @@
           <p:cNvPr id="7" name="Straight Connector 6">
             <a:extLst>
               <a:ext uri="{FF2B5EF4-FFF2-40B4-BE49-F238E27FC236}">
-                <a16:creationId xmlns:a16="http://schemas.microsoft.com/office/drawing/2014/main" id="{E7F97B71-C9AE-4076-9B63-480F5D01F6CA}"/>
+                <a16:creationId xmlns:a16="http://schemas.microsoft.com/office/drawing/2014/main" xmlns="" id="{E7F97B71-C9AE-4076-9B63-480F5D01F6CA}"/>
               </a:ext>
             </a:extLst>
           </p:cNvPr>
@@ -6491,7 +7109,7 @@
           <p:cNvPr id="17" name="Straight Connector 16">
             <a:extLst>
               <a:ext uri="{FF2B5EF4-FFF2-40B4-BE49-F238E27FC236}">
-                <a16:creationId xmlns:a16="http://schemas.microsoft.com/office/drawing/2014/main" id="{00B68A5E-8ABA-4C68-81FB-53D6D16362C2}"/>
+                <a16:creationId xmlns:a16="http://schemas.microsoft.com/office/drawing/2014/main" xmlns="" id="{00B68A5E-8ABA-4C68-81FB-53D6D16362C2}"/>
               </a:ext>
             </a:extLst>
           </p:cNvPr>
@@ -6528,7 +7146,7 @@
           <p:cNvPr id="19" name="TextBox 18">
             <a:extLst>
               <a:ext uri="{FF2B5EF4-FFF2-40B4-BE49-F238E27FC236}">
-                <a16:creationId xmlns:a16="http://schemas.microsoft.com/office/drawing/2014/main" id="{9026D60D-153A-4480-A649-A562486AF6A5}"/>
+                <a16:creationId xmlns:a16="http://schemas.microsoft.com/office/drawing/2014/main" xmlns="" id="{9026D60D-153A-4480-A649-A562486AF6A5}"/>
               </a:ext>
             </a:extLst>
           </p:cNvPr>
@@ -6613,7 +7231,7 @@
           <p:cNvPr id="9" name="Picture 8">
             <a:extLst>
               <a:ext uri="{FF2B5EF4-FFF2-40B4-BE49-F238E27FC236}">
-                <a16:creationId xmlns:a16="http://schemas.microsoft.com/office/drawing/2014/main" id="{26AF971D-96BC-4B98-AE55-4FA83DBFFEB2}"/>
+                <a16:creationId xmlns:a16="http://schemas.microsoft.com/office/drawing/2014/main" xmlns="" id="{26AF971D-96BC-4B98-AE55-4FA83DBFFEB2}"/>
               </a:ext>
             </a:extLst>
           </p:cNvPr>
@@ -6650,7 +7268,7 @@
           <p:cNvPr id="10" name="Picture 9">
             <a:extLst>
               <a:ext uri="{FF2B5EF4-FFF2-40B4-BE49-F238E27FC236}">
-                <a16:creationId xmlns:a16="http://schemas.microsoft.com/office/drawing/2014/main" id="{BD8FE98D-BA5A-4EC4-94A7-0289AC7EB8C8}"/>
+                <a16:creationId xmlns:a16="http://schemas.microsoft.com/office/drawing/2014/main" xmlns="" id="{BD8FE98D-BA5A-4EC4-94A7-0289AC7EB8C8}"/>
               </a:ext>
             </a:extLst>
           </p:cNvPr>
@@ -6685,6 +7303,13 @@
   <p:clrMapOvr>
     <a:masterClrMapping/>
   </p:clrMapOvr>
+  <p:timing>
+    <p:tnLst>
+      <p:par>
+        <p:cTn id="1" dur="indefinite" restart="never" nodeType="tmRoot"/>
+      </p:par>
+    </p:tnLst>
+  </p:timing>
 </p:sld>
 </file>
 
@@ -6732,24 +7357,21 @@
                   <a:srgbClr val="002060"/>
                 </a:solidFill>
               </a:rPr>
-              <a:t>Bishop 13.3: </a:t>
-            </a:r>
-            <a:r>
-              <a:rPr lang="en-US" sz="2800" dirty="0">
-                <a:solidFill>
-                  <a:srgbClr val="FF0000"/>
-                </a:solidFill>
-              </a:rPr>
-              <a:t>Check back later!</a:t>
-            </a:r>
-            <a:r>
-              <a:rPr lang="en-US" sz="2800" dirty="0">
+              <a:t>Bishop </a:t>
+            </a:r>
+            <a:r>
+              <a:rPr lang="en-US" sz="2800" dirty="0" smtClean="0">
                 <a:solidFill>
                   <a:srgbClr val="002060"/>
                 </a:solidFill>
               </a:rPr>
-              <a:t> </a:t>
-            </a:r>
+              <a:t>13.3</a:t>
+            </a:r>
+            <a:endParaRPr lang="en-US" sz="2800" dirty="0">
+              <a:solidFill>
+                <a:srgbClr val="002060"/>
+              </a:solidFill>
+            </a:endParaRPr>
           </a:p>
         </p:txBody>
       </p:sp>
@@ -6758,7 +7380,7 @@
           <p:cNvPr id="7" name="Picture 6">
             <a:extLst>
               <a:ext uri="{FF2B5EF4-FFF2-40B4-BE49-F238E27FC236}">
-                <a16:creationId xmlns:a16="http://schemas.microsoft.com/office/drawing/2014/main" id="{A6077F45-7AD7-432D-927D-291CC17C3696}"/>
+                <a16:creationId xmlns:a16="http://schemas.microsoft.com/office/drawing/2014/main" xmlns="" id="{A6077F45-7AD7-432D-927D-291CC17C3696}"/>
               </a:ext>
             </a:extLst>
           </p:cNvPr>
@@ -6788,7 +7410,7 @@
           <p:cNvPr id="2" name="Picture 1">
             <a:extLst>
               <a:ext uri="{FF2B5EF4-FFF2-40B4-BE49-F238E27FC236}">
-                <a16:creationId xmlns:a16="http://schemas.microsoft.com/office/drawing/2014/main" id="{DEA99781-BDB5-4F5B-9266-CBC071484A5F}"/>
+                <a16:creationId xmlns:a16="http://schemas.microsoft.com/office/drawing/2014/main" xmlns="" id="{DEA99781-BDB5-4F5B-9266-CBC071484A5F}"/>
               </a:ext>
             </a:extLst>
           </p:cNvPr>
@@ -6823,6 +7445,1676 @@
   <p:clrMapOvr>
     <a:masterClrMapping/>
   </p:clrMapOvr>
+  <p:timing>
+    <p:tnLst>
+      <p:par>
+        <p:cTn id="1" dur="indefinite" restart="never" nodeType="tmRoot"/>
+      </p:par>
+    </p:tnLst>
+  </p:timing>
+</p:sld>
+</file>
+
+<file path=ppt/slides/slide16.xml><?xml version="1.0" encoding="utf-8"?>
+<p:sld xmlns:a="http://schemas.openxmlformats.org/drawingml/2006/main" xmlns:r="http://schemas.openxmlformats.org/officeDocument/2006/relationships" xmlns:p="http://schemas.openxmlformats.org/presentationml/2006/main">
+  <p:cSld>
+    <p:spTree>
+      <p:nvGrpSpPr>
+        <p:cNvPr id="1" name=""/>
+        <p:cNvGrpSpPr/>
+        <p:nvPr/>
+      </p:nvGrpSpPr>
+      <p:grpSpPr>
+        <a:xfrm>
+          <a:off x="0" y="0"/>
+          <a:ext cx="0" cy="0"/>
+          <a:chOff x="0" y="0"/>
+          <a:chExt cx="0" cy="0"/>
+        </a:xfrm>
+      </p:grpSpPr>
+      <p:sp>
+        <p:nvSpPr>
+          <p:cNvPr id="5" name="TextBox 4"/>
+          <p:cNvSpPr txBox="1"/>
+          <p:nvPr/>
+        </p:nvSpPr>
+        <p:spPr>
+          <a:xfrm>
+            <a:off x="0" y="0"/>
+            <a:ext cx="8134066" cy="523220"/>
+          </a:xfrm>
+          <a:prstGeom prst="rect">
+            <a:avLst/>
+          </a:prstGeom>
+        </p:spPr>
+        <p:txBody>
+          <a:bodyPr rtlCol="0">
+            <a:spAutoFit/>
+          </a:bodyPr>
+          <a:lstStyle/>
+          <a:p>
+            <a:r>
+              <a:rPr lang="en-US" sz="2800" dirty="0">
+                <a:solidFill>
+                  <a:srgbClr val="002060"/>
+                </a:solidFill>
+              </a:rPr>
+              <a:t>Bishop </a:t>
+            </a:r>
+            <a:r>
+              <a:rPr lang="en-US" sz="2800" dirty="0" smtClean="0">
+                <a:solidFill>
+                  <a:srgbClr val="002060"/>
+                </a:solidFill>
+              </a:rPr>
+              <a:t>13.3</a:t>
+            </a:r>
+            <a:endParaRPr lang="en-US" sz="2800" dirty="0">
+              <a:solidFill>
+                <a:srgbClr val="002060"/>
+              </a:solidFill>
+            </a:endParaRPr>
+          </a:p>
+        </p:txBody>
+      </p:sp>
+      <p:pic>
+        <p:nvPicPr>
+          <p:cNvPr id="7" name="Picture 6">
+            <a:extLst>
+              <a:ext uri="{FF2B5EF4-FFF2-40B4-BE49-F238E27FC236}">
+                <a16:creationId xmlns:a16="http://schemas.microsoft.com/office/drawing/2014/main" xmlns="" id="{A6077F45-7AD7-432D-927D-291CC17C3696}"/>
+              </a:ext>
+            </a:extLst>
+          </p:cNvPr>
+          <p:cNvPicPr>
+            <a:picLocks noChangeAspect="1"/>
+          </p:cNvPicPr>
+          <p:nvPr/>
+        </p:nvPicPr>
+        <p:blipFill>
+          <a:blip r:embed="rId3"/>
+          <a:stretch>
+            <a:fillRect/>
+          </a:stretch>
+        </p:blipFill>
+        <p:spPr>
+          <a:xfrm>
+            <a:off x="91902" y="743138"/>
+            <a:ext cx="8686800" cy="1251086"/>
+          </a:xfrm>
+          <a:prstGeom prst="rect">
+            <a:avLst/>
+          </a:prstGeom>
+        </p:spPr>
+      </p:pic>
+      <p:cxnSp>
+        <p:nvCxnSpPr>
+          <p:cNvPr id="4" name="Straight Connector 3"/>
+          <p:cNvCxnSpPr/>
+          <p:nvPr/>
+        </p:nvCxnSpPr>
+        <p:spPr>
+          <a:xfrm>
+            <a:off x="1684421" y="1097280"/>
+            <a:ext cx="1703672" cy="0"/>
+          </a:xfrm>
+          <a:prstGeom prst="line">
+            <a:avLst/>
+          </a:prstGeom>
+          <a:ln w="28575">
+            <a:solidFill>
+              <a:srgbClr val="FFC000"/>
+            </a:solidFill>
+          </a:ln>
+        </p:spPr>
+        <p:style>
+          <a:lnRef idx="1">
+            <a:schemeClr val="accent2"/>
+          </a:lnRef>
+          <a:fillRef idx="0">
+            <a:schemeClr val="accent2"/>
+          </a:fillRef>
+          <a:effectRef idx="0">
+            <a:schemeClr val="accent2"/>
+          </a:effectRef>
+          <a:fontRef idx="minor">
+            <a:schemeClr val="tx1"/>
+          </a:fontRef>
+        </p:style>
+      </p:cxnSp>
+      <p:sp>
+        <p:nvSpPr>
+          <p:cNvPr id="6" name="TextBox 5"/>
+          <p:cNvSpPr txBox="1"/>
+          <p:nvPr/>
+        </p:nvSpPr>
+        <p:spPr>
+          <a:xfrm>
+            <a:off x="245444" y="1900614"/>
+            <a:ext cx="8090034" cy="923330"/>
+          </a:xfrm>
+          <a:prstGeom prst="rect">
+            <a:avLst/>
+          </a:prstGeom>
+          <a:noFill/>
+        </p:spPr>
+        <p:txBody>
+          <a:bodyPr wrap="square" rtlCol="0">
+            <a:spAutoFit/>
+          </a:bodyPr>
+          <a:lstStyle/>
+          <a:p>
+            <a:r>
+              <a:rPr lang="en-US" u="sng" dirty="0" smtClean="0">
+                <a:solidFill>
+                  <a:srgbClr val="0070C0"/>
+                </a:solidFill>
+              </a:rPr>
+              <a:t>Reminder from lecture slides</a:t>
+            </a:r>
+            <a:r>
+              <a:rPr lang="en-US" dirty="0" smtClean="0">
+                <a:solidFill>
+                  <a:srgbClr val="0070C0"/>
+                </a:solidFill>
+              </a:rPr>
+              <a:t>:</a:t>
+            </a:r>
+          </a:p>
+          <a:p>
+            <a:pPr marL="285750" indent="-285750">
+              <a:buFont typeface="Arial" panose="020B0604020202020204" pitchFamily="34" charset="0"/>
+              <a:buChar char="•"/>
+            </a:pPr>
+            <a:r>
+              <a:rPr lang="en-US" dirty="0" smtClean="0">
+                <a:solidFill>
+                  <a:srgbClr val="0070C0"/>
+                </a:solidFill>
+              </a:rPr>
+              <a:t>D-separation is a set of rules that let us determine conditional independence without going through the routine of computing joint/marginal probabilities.  </a:t>
+            </a:r>
+          </a:p>
+        </p:txBody>
+      </p:sp>
+      <p:grpSp>
+        <p:nvGrpSpPr>
+          <p:cNvPr id="18" name="Group 17"/>
+          <p:cNvGrpSpPr/>
+          <p:nvPr/>
+        </p:nvGrpSpPr>
+        <p:grpSpPr>
+          <a:xfrm>
+            <a:off x="2733574" y="2908432"/>
+            <a:ext cx="6217920" cy="3810414"/>
+            <a:chOff x="2733574" y="2908432"/>
+            <a:chExt cx="6217920" cy="3810414"/>
+          </a:xfrm>
+        </p:grpSpPr>
+        <p:pic>
+          <p:nvPicPr>
+            <p:cNvPr id="8" name="Picture 7"/>
+            <p:cNvPicPr>
+              <a:picLocks noChangeAspect="1"/>
+            </p:cNvPicPr>
+            <p:nvPr/>
+          </p:nvPicPr>
+          <p:blipFill>
+            <a:blip r:embed="rId4"/>
+            <a:stretch>
+              <a:fillRect/>
+            </a:stretch>
+          </p:blipFill>
+          <p:spPr>
+            <a:xfrm>
+              <a:off x="2733574" y="2908432"/>
+              <a:ext cx="6217920" cy="3810414"/>
+            </a:xfrm>
+            <a:prstGeom prst="rect">
+              <a:avLst/>
+            </a:prstGeom>
+          </p:spPr>
+        </p:pic>
+        <p:cxnSp>
+          <p:nvCxnSpPr>
+            <p:cNvPr id="9" name="Straight Connector 8"/>
+            <p:cNvCxnSpPr/>
+            <p:nvPr/>
+          </p:nvCxnSpPr>
+          <p:spPr>
+            <a:xfrm>
+              <a:off x="5167162" y="3761873"/>
+              <a:ext cx="731520" cy="0"/>
+            </a:xfrm>
+            <a:prstGeom prst="line">
+              <a:avLst/>
+            </a:prstGeom>
+            <a:ln w="28575">
+              <a:solidFill>
+                <a:srgbClr val="FFC000"/>
+              </a:solidFill>
+            </a:ln>
+          </p:spPr>
+          <p:style>
+            <a:lnRef idx="1">
+              <a:schemeClr val="accent2"/>
+            </a:lnRef>
+            <a:fillRef idx="0">
+              <a:schemeClr val="accent2"/>
+            </a:fillRef>
+            <a:effectRef idx="0">
+              <a:schemeClr val="accent2"/>
+            </a:effectRef>
+            <a:fontRef idx="minor">
+              <a:schemeClr val="tx1"/>
+            </a:fontRef>
+          </p:style>
+        </p:cxnSp>
+        <p:cxnSp>
+          <p:nvCxnSpPr>
+            <p:cNvPr id="10" name="Straight Connector 9"/>
+            <p:cNvCxnSpPr/>
+            <p:nvPr/>
+          </p:nvCxnSpPr>
+          <p:spPr>
+            <a:xfrm>
+              <a:off x="6965482" y="4328159"/>
+              <a:ext cx="1097280" cy="0"/>
+            </a:xfrm>
+            <a:prstGeom prst="line">
+              <a:avLst/>
+            </a:prstGeom>
+            <a:ln w="28575">
+              <a:solidFill>
+                <a:srgbClr val="FFC000"/>
+              </a:solidFill>
+            </a:ln>
+          </p:spPr>
+          <p:style>
+            <a:lnRef idx="1">
+              <a:schemeClr val="accent2"/>
+            </a:lnRef>
+            <a:fillRef idx="0">
+              <a:schemeClr val="accent2"/>
+            </a:fillRef>
+            <a:effectRef idx="0">
+              <a:schemeClr val="accent2"/>
+            </a:effectRef>
+            <a:fontRef idx="minor">
+              <a:schemeClr val="tx1"/>
+            </a:fontRef>
+          </p:style>
+        </p:cxnSp>
+        <p:cxnSp>
+          <p:nvCxnSpPr>
+            <p:cNvPr id="11" name="Straight Connector 10"/>
+            <p:cNvCxnSpPr/>
+            <p:nvPr/>
+          </p:nvCxnSpPr>
+          <p:spPr>
+            <a:xfrm>
+              <a:off x="8402854" y="4328159"/>
+              <a:ext cx="365760" cy="0"/>
+            </a:xfrm>
+            <a:prstGeom prst="line">
+              <a:avLst/>
+            </a:prstGeom>
+            <a:ln w="28575">
+              <a:solidFill>
+                <a:srgbClr val="FFC000"/>
+              </a:solidFill>
+            </a:ln>
+          </p:spPr>
+          <p:style>
+            <a:lnRef idx="1">
+              <a:schemeClr val="accent2"/>
+            </a:lnRef>
+            <a:fillRef idx="0">
+              <a:schemeClr val="accent2"/>
+            </a:fillRef>
+            <a:effectRef idx="0">
+              <a:schemeClr val="accent2"/>
+            </a:effectRef>
+            <a:fontRef idx="minor">
+              <a:schemeClr val="tx1"/>
+            </a:fontRef>
+          </p:style>
+        </p:cxnSp>
+        <p:cxnSp>
+          <p:nvCxnSpPr>
+            <p:cNvPr id="12" name="Straight Connector 11"/>
+            <p:cNvCxnSpPr/>
+            <p:nvPr/>
+          </p:nvCxnSpPr>
+          <p:spPr>
+            <a:xfrm>
+              <a:off x="3521241" y="4624938"/>
+              <a:ext cx="548640" cy="0"/>
+            </a:xfrm>
+            <a:prstGeom prst="line">
+              <a:avLst/>
+            </a:prstGeom>
+            <a:ln w="28575">
+              <a:solidFill>
+                <a:srgbClr val="FFC000"/>
+              </a:solidFill>
+            </a:ln>
+          </p:spPr>
+          <p:style>
+            <a:lnRef idx="1">
+              <a:schemeClr val="accent2"/>
+            </a:lnRef>
+            <a:fillRef idx="0">
+              <a:schemeClr val="accent2"/>
+            </a:fillRef>
+            <a:effectRef idx="0">
+              <a:schemeClr val="accent2"/>
+            </a:effectRef>
+            <a:fontRef idx="minor">
+              <a:schemeClr val="tx1"/>
+            </a:fontRef>
+          </p:style>
+        </p:cxnSp>
+        <p:cxnSp>
+          <p:nvCxnSpPr>
+            <p:cNvPr id="13" name="Straight Connector 12"/>
+            <p:cNvCxnSpPr/>
+            <p:nvPr/>
+          </p:nvCxnSpPr>
+          <p:spPr>
+            <a:xfrm>
+              <a:off x="7768306" y="4624938"/>
+              <a:ext cx="365760" cy="0"/>
+            </a:xfrm>
+            <a:prstGeom prst="line">
+              <a:avLst/>
+            </a:prstGeom>
+            <a:ln w="28575">
+              <a:solidFill>
+                <a:srgbClr val="FFC000"/>
+              </a:solidFill>
+            </a:ln>
+          </p:spPr>
+          <p:style>
+            <a:lnRef idx="1">
+              <a:schemeClr val="accent2"/>
+            </a:lnRef>
+            <a:fillRef idx="0">
+              <a:schemeClr val="accent2"/>
+            </a:fillRef>
+            <a:effectRef idx="0">
+              <a:schemeClr val="accent2"/>
+            </a:effectRef>
+            <a:fontRef idx="minor">
+              <a:schemeClr val="tx1"/>
+            </a:fontRef>
+          </p:style>
+        </p:cxnSp>
+        <p:cxnSp>
+          <p:nvCxnSpPr>
+            <p:cNvPr id="14" name="Straight Connector 13"/>
+            <p:cNvCxnSpPr/>
+            <p:nvPr/>
+          </p:nvCxnSpPr>
+          <p:spPr>
+            <a:xfrm>
+              <a:off x="5167162" y="4915300"/>
+              <a:ext cx="1280160" cy="0"/>
+            </a:xfrm>
+            <a:prstGeom prst="line">
+              <a:avLst/>
+            </a:prstGeom>
+            <a:ln w="28575">
+              <a:solidFill>
+                <a:srgbClr val="FFC000"/>
+              </a:solidFill>
+            </a:ln>
+          </p:spPr>
+          <p:style>
+            <a:lnRef idx="1">
+              <a:schemeClr val="accent2"/>
+            </a:lnRef>
+            <a:fillRef idx="0">
+              <a:schemeClr val="accent2"/>
+            </a:fillRef>
+            <a:effectRef idx="0">
+              <a:schemeClr val="accent2"/>
+            </a:effectRef>
+            <a:fontRef idx="minor">
+              <a:schemeClr val="tx1"/>
+            </a:fontRef>
+          </p:style>
+        </p:cxnSp>
+        <p:cxnSp>
+          <p:nvCxnSpPr>
+            <p:cNvPr id="15" name="Straight Connector 14"/>
+            <p:cNvCxnSpPr/>
+            <p:nvPr/>
+          </p:nvCxnSpPr>
+          <p:spPr>
+            <a:xfrm>
+              <a:off x="3521241" y="5192829"/>
+              <a:ext cx="1645920" cy="0"/>
+            </a:xfrm>
+            <a:prstGeom prst="line">
+              <a:avLst/>
+            </a:prstGeom>
+            <a:ln w="28575">
+              <a:solidFill>
+                <a:srgbClr val="FFC000"/>
+              </a:solidFill>
+            </a:ln>
+          </p:spPr>
+          <p:style>
+            <a:lnRef idx="1">
+              <a:schemeClr val="accent2"/>
+            </a:lnRef>
+            <a:fillRef idx="0">
+              <a:schemeClr val="accent2"/>
+            </a:fillRef>
+            <a:effectRef idx="0">
+              <a:schemeClr val="accent2"/>
+            </a:effectRef>
+            <a:fontRef idx="minor">
+              <a:schemeClr val="tx1"/>
+            </a:fontRef>
+          </p:style>
+        </p:cxnSp>
+        <p:cxnSp>
+          <p:nvCxnSpPr>
+            <p:cNvPr id="16" name="Straight Connector 15"/>
+            <p:cNvCxnSpPr/>
+            <p:nvPr/>
+          </p:nvCxnSpPr>
+          <p:spPr>
+            <a:xfrm>
+              <a:off x="5671685" y="5768740"/>
+              <a:ext cx="822960" cy="0"/>
+            </a:xfrm>
+            <a:prstGeom prst="line">
+              <a:avLst/>
+            </a:prstGeom>
+            <a:ln w="28575">
+              <a:solidFill>
+                <a:srgbClr val="FFC000"/>
+              </a:solidFill>
+            </a:ln>
+          </p:spPr>
+          <p:style>
+            <a:lnRef idx="1">
+              <a:schemeClr val="accent2"/>
+            </a:lnRef>
+            <a:fillRef idx="0">
+              <a:schemeClr val="accent2"/>
+            </a:fillRef>
+            <a:effectRef idx="0">
+              <a:schemeClr val="accent2"/>
+            </a:effectRef>
+            <a:fontRef idx="minor">
+              <a:schemeClr val="tx1"/>
+            </a:fontRef>
+          </p:style>
+        </p:cxnSp>
+        <p:cxnSp>
+          <p:nvCxnSpPr>
+            <p:cNvPr id="17" name="Straight Connector 16"/>
+            <p:cNvCxnSpPr/>
+            <p:nvPr/>
+          </p:nvCxnSpPr>
+          <p:spPr>
+            <a:xfrm>
+              <a:off x="3109761" y="6363902"/>
+              <a:ext cx="3017520" cy="0"/>
+            </a:xfrm>
+            <a:prstGeom prst="line">
+              <a:avLst/>
+            </a:prstGeom>
+            <a:ln w="28575">
+              <a:solidFill>
+                <a:srgbClr val="FFC000"/>
+              </a:solidFill>
+            </a:ln>
+          </p:spPr>
+          <p:style>
+            <a:lnRef idx="1">
+              <a:schemeClr val="accent2"/>
+            </a:lnRef>
+            <a:fillRef idx="0">
+              <a:schemeClr val="accent2"/>
+            </a:fillRef>
+            <a:effectRef idx="0">
+              <a:schemeClr val="accent2"/>
+            </a:effectRef>
+            <a:fontRef idx="minor">
+              <a:schemeClr val="tx1"/>
+            </a:fontRef>
+          </p:style>
+        </p:cxnSp>
+      </p:grpSp>
+    </p:spTree>
+    <p:extLst>
+      <p:ext uri="{BB962C8B-B14F-4D97-AF65-F5344CB8AC3E}">
+        <p14:creationId xmlns:p14="http://schemas.microsoft.com/office/powerpoint/2010/main" val="2169200794"/>
+      </p:ext>
+    </p:extLst>
+  </p:cSld>
+  <p:clrMapOvr>
+    <a:masterClrMapping/>
+  </p:clrMapOvr>
+  <p:timing>
+    <p:tnLst>
+      <p:par>
+        <p:cTn id="1" dur="indefinite" restart="never" nodeType="tmRoot"/>
+      </p:par>
+    </p:tnLst>
+  </p:timing>
+</p:sld>
+</file>
+
+<file path=ppt/slides/slide17.xml><?xml version="1.0" encoding="utf-8"?>
+<p:sld xmlns:a="http://schemas.openxmlformats.org/drawingml/2006/main" xmlns:r="http://schemas.openxmlformats.org/officeDocument/2006/relationships" xmlns:p="http://schemas.openxmlformats.org/presentationml/2006/main">
+  <p:cSld>
+    <p:spTree>
+      <p:nvGrpSpPr>
+        <p:cNvPr id="1" name=""/>
+        <p:cNvGrpSpPr/>
+        <p:nvPr/>
+      </p:nvGrpSpPr>
+      <p:grpSpPr>
+        <a:xfrm>
+          <a:off x="0" y="0"/>
+          <a:ext cx="0" cy="0"/>
+          <a:chOff x="0" y="0"/>
+          <a:chExt cx="0" cy="0"/>
+        </a:xfrm>
+      </p:grpSpPr>
+      <p:sp>
+        <p:nvSpPr>
+          <p:cNvPr id="5" name="TextBox 4"/>
+          <p:cNvSpPr txBox="1"/>
+          <p:nvPr/>
+        </p:nvSpPr>
+        <p:spPr>
+          <a:xfrm>
+            <a:off x="0" y="0"/>
+            <a:ext cx="8134066" cy="523220"/>
+          </a:xfrm>
+          <a:prstGeom prst="rect">
+            <a:avLst/>
+          </a:prstGeom>
+        </p:spPr>
+        <p:txBody>
+          <a:bodyPr rtlCol="0">
+            <a:spAutoFit/>
+          </a:bodyPr>
+          <a:lstStyle/>
+          <a:p>
+            <a:r>
+              <a:rPr lang="en-US" sz="2800" dirty="0">
+                <a:solidFill>
+                  <a:srgbClr val="002060"/>
+                </a:solidFill>
+              </a:rPr>
+              <a:t>Bishop </a:t>
+            </a:r>
+            <a:r>
+              <a:rPr lang="en-US" sz="2800" dirty="0" smtClean="0">
+                <a:solidFill>
+                  <a:srgbClr val="002060"/>
+                </a:solidFill>
+              </a:rPr>
+              <a:t>13.3</a:t>
+            </a:r>
+            <a:endParaRPr lang="en-US" sz="2800" dirty="0">
+              <a:solidFill>
+                <a:srgbClr val="002060"/>
+              </a:solidFill>
+            </a:endParaRPr>
+          </a:p>
+        </p:txBody>
+      </p:sp>
+      <p:pic>
+        <p:nvPicPr>
+          <p:cNvPr id="7" name="Picture 6">
+            <a:extLst>
+              <a:ext uri="{FF2B5EF4-FFF2-40B4-BE49-F238E27FC236}">
+                <a16:creationId xmlns:a16="http://schemas.microsoft.com/office/drawing/2014/main" xmlns="" id="{A6077F45-7AD7-432D-927D-291CC17C3696}"/>
+              </a:ext>
+            </a:extLst>
+          </p:cNvPr>
+          <p:cNvPicPr>
+            <a:picLocks noChangeAspect="1"/>
+          </p:cNvPicPr>
+          <p:nvPr/>
+        </p:nvPicPr>
+        <p:blipFill>
+          <a:blip r:embed="rId3"/>
+          <a:stretch>
+            <a:fillRect/>
+          </a:stretch>
+        </p:blipFill>
+        <p:spPr>
+          <a:xfrm>
+            <a:off x="81814" y="584230"/>
+            <a:ext cx="8686800" cy="1251086"/>
+          </a:xfrm>
+          <a:prstGeom prst="rect">
+            <a:avLst/>
+          </a:prstGeom>
+        </p:spPr>
+      </p:pic>
+      <p:pic>
+        <p:nvPicPr>
+          <p:cNvPr id="8" name="Picture 7"/>
+          <p:cNvPicPr>
+            <a:picLocks noChangeAspect="1"/>
+          </p:cNvPicPr>
+          <p:nvPr/>
+        </p:nvPicPr>
+        <p:blipFill>
+          <a:blip r:embed="rId4"/>
+          <a:stretch>
+            <a:fillRect/>
+          </a:stretch>
+        </p:blipFill>
+        <p:spPr>
+          <a:xfrm>
+            <a:off x="2733574" y="2908432"/>
+            <a:ext cx="6217920" cy="3810414"/>
+          </a:xfrm>
+          <a:prstGeom prst="rect">
+            <a:avLst/>
+          </a:prstGeom>
+        </p:spPr>
+      </p:pic>
+      <p:pic>
+        <p:nvPicPr>
+          <p:cNvPr id="19" name="Picture 18">
+            <a:extLst>
+              <a:ext uri="{FF2B5EF4-FFF2-40B4-BE49-F238E27FC236}">
+                <a16:creationId xmlns:a16="http://schemas.microsoft.com/office/drawing/2014/main" xmlns="" id="{DEA99781-BDB5-4F5B-9266-CBC071484A5F}"/>
+              </a:ext>
+            </a:extLst>
+          </p:cNvPr>
+          <p:cNvPicPr>
+            <a:picLocks noChangeAspect="1"/>
+          </p:cNvPicPr>
+          <p:nvPr/>
+        </p:nvPicPr>
+        <p:blipFill>
+          <a:blip r:embed="rId5"/>
+          <a:stretch>
+            <a:fillRect/>
+          </a:stretch>
+        </p:blipFill>
+        <p:spPr>
+          <a:xfrm>
+            <a:off x="325655" y="1742467"/>
+            <a:ext cx="5486400" cy="1116510"/>
+          </a:xfrm>
+          <a:prstGeom prst="rect">
+            <a:avLst/>
+          </a:prstGeom>
+        </p:spPr>
+      </p:pic>
+      <p:cxnSp>
+        <p:nvCxnSpPr>
+          <p:cNvPr id="3" name="Straight Connector 2"/>
+          <p:cNvCxnSpPr/>
+          <p:nvPr/>
+        </p:nvCxnSpPr>
+        <p:spPr>
+          <a:xfrm>
+            <a:off x="5812055" y="952901"/>
+            <a:ext cx="1262513" cy="0"/>
+          </a:xfrm>
+          <a:prstGeom prst="line">
+            <a:avLst/>
+          </a:prstGeom>
+          <a:ln w="38100">
+            <a:solidFill>
+              <a:srgbClr val="00B050"/>
+            </a:solidFill>
+          </a:ln>
+        </p:spPr>
+        <p:style>
+          <a:lnRef idx="1">
+            <a:schemeClr val="accent1"/>
+          </a:lnRef>
+          <a:fillRef idx="0">
+            <a:schemeClr val="accent1"/>
+          </a:fillRef>
+          <a:effectRef idx="0">
+            <a:schemeClr val="accent1"/>
+          </a:effectRef>
+          <a:fontRef idx="minor">
+            <a:schemeClr val="tx1"/>
+          </a:fontRef>
+        </p:style>
+      </p:cxnSp>
+      <p:cxnSp>
+        <p:nvCxnSpPr>
+          <p:cNvPr id="20" name="Straight Connector 19"/>
+          <p:cNvCxnSpPr/>
+          <p:nvPr/>
+        </p:nvCxnSpPr>
+        <p:spPr>
+          <a:xfrm>
+            <a:off x="2980624" y="3193984"/>
+            <a:ext cx="1262513" cy="0"/>
+          </a:xfrm>
+          <a:prstGeom prst="line">
+            <a:avLst/>
+          </a:prstGeom>
+          <a:ln w="38100">
+            <a:solidFill>
+              <a:srgbClr val="00B050"/>
+            </a:solidFill>
+          </a:ln>
+        </p:spPr>
+        <p:style>
+          <a:lnRef idx="1">
+            <a:schemeClr val="accent1"/>
+          </a:lnRef>
+          <a:fillRef idx="0">
+            <a:schemeClr val="accent1"/>
+          </a:fillRef>
+          <a:effectRef idx="0">
+            <a:schemeClr val="accent1"/>
+          </a:effectRef>
+          <a:fontRef idx="minor">
+            <a:schemeClr val="tx1"/>
+          </a:fontRef>
+        </p:style>
+      </p:cxnSp>
+      <p:sp>
+        <p:nvSpPr>
+          <p:cNvPr id="21" name="TextBox 20"/>
+          <p:cNvSpPr txBox="1"/>
+          <p:nvPr/>
+        </p:nvSpPr>
+        <p:spPr>
+          <a:xfrm>
+            <a:off x="81814" y="3010233"/>
+            <a:ext cx="1981201" cy="3416320"/>
+          </a:xfrm>
+          <a:prstGeom prst="rect">
+            <a:avLst/>
+          </a:prstGeom>
+          <a:noFill/>
+        </p:spPr>
+        <p:txBody>
+          <a:bodyPr wrap="square" rtlCol="0">
+            <a:spAutoFit/>
+          </a:bodyPr>
+          <a:lstStyle/>
+          <a:p>
+            <a:r>
+              <a:rPr lang="en-US" dirty="0" smtClean="0">
+                <a:solidFill>
+                  <a:srgbClr val="00B050"/>
+                </a:solidFill>
+              </a:rPr>
+              <a:t>A and B correspond to any pair of the x</a:t>
+            </a:r>
+            <a:r>
+              <a:rPr lang="en-US" baseline="-25000" dirty="0" smtClean="0">
+                <a:solidFill>
+                  <a:srgbClr val="00B050"/>
+                </a:solidFill>
+              </a:rPr>
+              <a:t>i</a:t>
+            </a:r>
+          </a:p>
+          <a:p>
+            <a:r>
+              <a:rPr lang="en-US" dirty="0" smtClean="0">
+                <a:solidFill>
+                  <a:srgbClr val="00B050"/>
+                </a:solidFill>
+              </a:rPr>
+              <a:t>(observed variables – note this is a Hidden Markov model; the x</a:t>
+            </a:r>
+            <a:r>
+              <a:rPr lang="en-US" baseline="-25000" dirty="0" smtClean="0">
+                <a:solidFill>
+                  <a:srgbClr val="00B050"/>
+                </a:solidFill>
+              </a:rPr>
+              <a:t>i</a:t>
+            </a:r>
+            <a:r>
+              <a:rPr lang="en-US" dirty="0" smtClean="0">
+                <a:solidFill>
+                  <a:srgbClr val="00B050"/>
+                </a:solidFill>
+              </a:rPr>
+              <a:t> are observed and the </a:t>
+            </a:r>
+            <a:r>
+              <a:rPr lang="en-US" dirty="0" err="1" smtClean="0">
+                <a:solidFill>
+                  <a:srgbClr val="00B050"/>
+                </a:solidFill>
+              </a:rPr>
+              <a:t>z</a:t>
+            </a:r>
+            <a:r>
+              <a:rPr lang="en-US" baseline="-25000" dirty="0" err="1" smtClean="0">
+                <a:solidFill>
+                  <a:srgbClr val="00B050"/>
+                </a:solidFill>
+              </a:rPr>
+              <a:t>i</a:t>
+            </a:r>
+            <a:r>
+              <a:rPr lang="en-US" dirty="0" smtClean="0">
+                <a:solidFill>
+                  <a:srgbClr val="00B050"/>
+                </a:solidFill>
+              </a:rPr>
+              <a:t> are latent and never observed, see slide 45 in lecture)</a:t>
+            </a:r>
+          </a:p>
+        </p:txBody>
+      </p:sp>
+    </p:spTree>
+    <p:extLst>
+      <p:ext uri="{BB962C8B-B14F-4D97-AF65-F5344CB8AC3E}">
+        <p14:creationId xmlns:p14="http://schemas.microsoft.com/office/powerpoint/2010/main" val="2543071258"/>
+      </p:ext>
+    </p:extLst>
+  </p:cSld>
+  <p:clrMapOvr>
+    <a:masterClrMapping/>
+  </p:clrMapOvr>
+  <p:timing>
+    <p:tnLst>
+      <p:par>
+        <p:cTn id="1" dur="indefinite" restart="never" nodeType="tmRoot"/>
+      </p:par>
+    </p:tnLst>
+  </p:timing>
+</p:sld>
+</file>
+
+<file path=ppt/slides/slide18.xml><?xml version="1.0" encoding="utf-8"?>
+<p:sld xmlns:a="http://schemas.openxmlformats.org/drawingml/2006/main" xmlns:r="http://schemas.openxmlformats.org/officeDocument/2006/relationships" xmlns:p="http://schemas.openxmlformats.org/presentationml/2006/main">
+  <p:cSld>
+    <p:spTree>
+      <p:nvGrpSpPr>
+        <p:cNvPr id="1" name=""/>
+        <p:cNvGrpSpPr/>
+        <p:nvPr/>
+      </p:nvGrpSpPr>
+      <p:grpSpPr>
+        <a:xfrm>
+          <a:off x="0" y="0"/>
+          <a:ext cx="0" cy="0"/>
+          <a:chOff x="0" y="0"/>
+          <a:chExt cx="0" cy="0"/>
+        </a:xfrm>
+      </p:grpSpPr>
+      <p:sp>
+        <p:nvSpPr>
+          <p:cNvPr id="5" name="TextBox 4"/>
+          <p:cNvSpPr txBox="1"/>
+          <p:nvPr/>
+        </p:nvSpPr>
+        <p:spPr>
+          <a:xfrm>
+            <a:off x="0" y="0"/>
+            <a:ext cx="8134066" cy="523220"/>
+          </a:xfrm>
+          <a:prstGeom prst="rect">
+            <a:avLst/>
+          </a:prstGeom>
+        </p:spPr>
+        <p:txBody>
+          <a:bodyPr rtlCol="0">
+            <a:spAutoFit/>
+          </a:bodyPr>
+          <a:lstStyle/>
+          <a:p>
+            <a:r>
+              <a:rPr lang="en-US" sz="2800" dirty="0">
+                <a:solidFill>
+                  <a:srgbClr val="002060"/>
+                </a:solidFill>
+              </a:rPr>
+              <a:t>Bishop </a:t>
+            </a:r>
+            <a:r>
+              <a:rPr lang="en-US" sz="2800" dirty="0" smtClean="0">
+                <a:solidFill>
+                  <a:srgbClr val="002060"/>
+                </a:solidFill>
+              </a:rPr>
+              <a:t>13.3</a:t>
+            </a:r>
+            <a:endParaRPr lang="en-US" sz="2800" dirty="0">
+              <a:solidFill>
+                <a:srgbClr val="002060"/>
+              </a:solidFill>
+            </a:endParaRPr>
+          </a:p>
+        </p:txBody>
+      </p:sp>
+      <p:pic>
+        <p:nvPicPr>
+          <p:cNvPr id="7" name="Picture 6">
+            <a:extLst>
+              <a:ext uri="{FF2B5EF4-FFF2-40B4-BE49-F238E27FC236}">
+                <a16:creationId xmlns:a16="http://schemas.microsoft.com/office/drawing/2014/main" xmlns="" id="{A6077F45-7AD7-432D-927D-291CC17C3696}"/>
+              </a:ext>
+            </a:extLst>
+          </p:cNvPr>
+          <p:cNvPicPr>
+            <a:picLocks noChangeAspect="1"/>
+          </p:cNvPicPr>
+          <p:nvPr/>
+        </p:nvPicPr>
+        <p:blipFill>
+          <a:blip r:embed="rId3"/>
+          <a:stretch>
+            <a:fillRect/>
+          </a:stretch>
+        </p:blipFill>
+        <p:spPr>
+          <a:xfrm>
+            <a:off x="81814" y="584230"/>
+            <a:ext cx="8686800" cy="1251086"/>
+          </a:xfrm>
+          <a:prstGeom prst="rect">
+            <a:avLst/>
+          </a:prstGeom>
+        </p:spPr>
+      </p:pic>
+      <p:pic>
+        <p:nvPicPr>
+          <p:cNvPr id="8" name="Picture 7"/>
+          <p:cNvPicPr>
+            <a:picLocks noChangeAspect="1"/>
+          </p:cNvPicPr>
+          <p:nvPr/>
+        </p:nvPicPr>
+        <p:blipFill>
+          <a:blip r:embed="rId4"/>
+          <a:stretch>
+            <a:fillRect/>
+          </a:stretch>
+        </p:blipFill>
+        <p:spPr>
+          <a:xfrm>
+            <a:off x="2733574" y="2908432"/>
+            <a:ext cx="6217920" cy="3810414"/>
+          </a:xfrm>
+          <a:prstGeom prst="rect">
+            <a:avLst/>
+          </a:prstGeom>
+        </p:spPr>
+      </p:pic>
+      <p:pic>
+        <p:nvPicPr>
+          <p:cNvPr id="19" name="Picture 18">
+            <a:extLst>
+              <a:ext uri="{FF2B5EF4-FFF2-40B4-BE49-F238E27FC236}">
+                <a16:creationId xmlns:a16="http://schemas.microsoft.com/office/drawing/2014/main" xmlns="" id="{DEA99781-BDB5-4F5B-9266-CBC071484A5F}"/>
+              </a:ext>
+            </a:extLst>
+          </p:cNvPr>
+          <p:cNvPicPr>
+            <a:picLocks noChangeAspect="1"/>
+          </p:cNvPicPr>
+          <p:nvPr/>
+        </p:nvPicPr>
+        <p:blipFill>
+          <a:blip r:embed="rId5"/>
+          <a:stretch>
+            <a:fillRect/>
+          </a:stretch>
+        </p:blipFill>
+        <p:spPr>
+          <a:xfrm>
+            <a:off x="325655" y="1742467"/>
+            <a:ext cx="5486400" cy="1116510"/>
+          </a:xfrm>
+          <a:prstGeom prst="rect">
+            <a:avLst/>
+          </a:prstGeom>
+        </p:spPr>
+      </p:pic>
+      <p:cxnSp>
+        <p:nvCxnSpPr>
+          <p:cNvPr id="3" name="Straight Connector 2"/>
+          <p:cNvCxnSpPr/>
+          <p:nvPr/>
+        </p:nvCxnSpPr>
+        <p:spPr>
+          <a:xfrm>
+            <a:off x="5812055" y="952901"/>
+            <a:ext cx="1262513" cy="0"/>
+          </a:xfrm>
+          <a:prstGeom prst="line">
+            <a:avLst/>
+          </a:prstGeom>
+          <a:ln w="38100">
+            <a:solidFill>
+              <a:srgbClr val="00B050"/>
+            </a:solidFill>
+          </a:ln>
+        </p:spPr>
+        <p:style>
+          <a:lnRef idx="1">
+            <a:schemeClr val="accent1"/>
+          </a:lnRef>
+          <a:fillRef idx="0">
+            <a:schemeClr val="accent1"/>
+          </a:fillRef>
+          <a:effectRef idx="0">
+            <a:schemeClr val="accent1"/>
+          </a:effectRef>
+          <a:fontRef idx="minor">
+            <a:schemeClr val="tx1"/>
+          </a:fontRef>
+        </p:style>
+      </p:cxnSp>
+      <p:cxnSp>
+        <p:nvCxnSpPr>
+          <p:cNvPr id="20" name="Straight Connector 19"/>
+          <p:cNvCxnSpPr/>
+          <p:nvPr/>
+        </p:nvCxnSpPr>
+        <p:spPr>
+          <a:xfrm flipV="1">
+            <a:off x="3019125" y="3773103"/>
+            <a:ext cx="2900412" cy="8022"/>
+          </a:xfrm>
+          <a:prstGeom prst="line">
+            <a:avLst/>
+          </a:prstGeom>
+          <a:ln w="38100">
+            <a:solidFill>
+              <a:srgbClr val="00B050"/>
+            </a:solidFill>
+          </a:ln>
+        </p:spPr>
+        <p:style>
+          <a:lnRef idx="1">
+            <a:schemeClr val="accent1"/>
+          </a:lnRef>
+          <a:fillRef idx="0">
+            <a:schemeClr val="accent1"/>
+          </a:fillRef>
+          <a:effectRef idx="0">
+            <a:schemeClr val="accent1"/>
+          </a:effectRef>
+          <a:fontRef idx="minor">
+            <a:schemeClr val="tx1"/>
+          </a:fontRef>
+        </p:style>
+      </p:cxnSp>
+      <p:sp>
+        <p:nvSpPr>
+          <p:cNvPr id="21" name="TextBox 20"/>
+          <p:cNvSpPr txBox="1"/>
+          <p:nvPr/>
+        </p:nvSpPr>
+        <p:spPr>
+          <a:xfrm>
+            <a:off x="81814" y="3010233"/>
+            <a:ext cx="1981201" cy="2862322"/>
+          </a:xfrm>
+          <a:prstGeom prst="rect">
+            <a:avLst/>
+          </a:prstGeom>
+          <a:noFill/>
+        </p:spPr>
+        <p:txBody>
+          <a:bodyPr wrap="square" rtlCol="0">
+            <a:spAutoFit/>
+          </a:bodyPr>
+          <a:lstStyle/>
+          <a:p>
+            <a:r>
+              <a:rPr lang="en-US" dirty="0" smtClean="0">
+                <a:solidFill>
+                  <a:srgbClr val="00B050"/>
+                </a:solidFill>
+              </a:rPr>
+              <a:t>For any pair of x</a:t>
+            </a:r>
+            <a:r>
+              <a:rPr lang="en-US" baseline="-25000" dirty="0" smtClean="0">
+                <a:solidFill>
+                  <a:srgbClr val="00B050"/>
+                </a:solidFill>
+              </a:rPr>
+              <a:t>i</a:t>
+            </a:r>
+            <a:r>
+              <a:rPr lang="en-US" dirty="0" smtClean="0">
+                <a:solidFill>
+                  <a:srgbClr val="00B050"/>
+                </a:solidFill>
+              </a:rPr>
+              <a:t> to be conditionally independent, we would need these x nodes to be connected by paths containing nodes that satisfy criteria for being “blocked.”</a:t>
+            </a:r>
+          </a:p>
+        </p:txBody>
+      </p:sp>
+      <p:cxnSp>
+        <p:nvCxnSpPr>
+          <p:cNvPr id="10" name="Straight Connector 9"/>
+          <p:cNvCxnSpPr/>
+          <p:nvPr/>
+        </p:nvCxnSpPr>
+        <p:spPr>
+          <a:xfrm flipV="1">
+            <a:off x="3068855" y="5763928"/>
+            <a:ext cx="2900412" cy="8022"/>
+          </a:xfrm>
+          <a:prstGeom prst="line">
+            <a:avLst/>
+          </a:prstGeom>
+          <a:ln w="38100">
+            <a:solidFill>
+              <a:srgbClr val="00B050"/>
+            </a:solidFill>
+          </a:ln>
+        </p:spPr>
+        <p:style>
+          <a:lnRef idx="1">
+            <a:schemeClr val="accent1"/>
+          </a:lnRef>
+          <a:fillRef idx="0">
+            <a:schemeClr val="accent1"/>
+          </a:fillRef>
+          <a:effectRef idx="0">
+            <a:schemeClr val="accent1"/>
+          </a:effectRef>
+          <a:fontRef idx="minor">
+            <a:schemeClr val="tx1"/>
+          </a:fontRef>
+        </p:style>
+      </p:cxnSp>
+      <p:cxnSp>
+        <p:nvCxnSpPr>
+          <p:cNvPr id="11" name="Straight Connector 10"/>
+          <p:cNvCxnSpPr/>
+          <p:nvPr/>
+        </p:nvCxnSpPr>
+        <p:spPr>
+          <a:xfrm flipV="1">
+            <a:off x="3019125" y="6063916"/>
+            <a:ext cx="2168892" cy="4813"/>
+          </a:xfrm>
+          <a:prstGeom prst="line">
+            <a:avLst/>
+          </a:prstGeom>
+          <a:ln w="38100">
+            <a:solidFill>
+              <a:srgbClr val="00B050"/>
+            </a:solidFill>
+          </a:ln>
+        </p:spPr>
+        <p:style>
+          <a:lnRef idx="1">
+            <a:schemeClr val="accent1"/>
+          </a:lnRef>
+          <a:fillRef idx="0">
+            <a:schemeClr val="accent1"/>
+          </a:fillRef>
+          <a:effectRef idx="0">
+            <a:schemeClr val="accent1"/>
+          </a:effectRef>
+          <a:fontRef idx="minor">
+            <a:schemeClr val="tx1"/>
+          </a:fontRef>
+        </p:style>
+      </p:cxnSp>
+      <p:cxnSp>
+        <p:nvCxnSpPr>
+          <p:cNvPr id="13" name="Straight Connector 12"/>
+          <p:cNvCxnSpPr/>
+          <p:nvPr/>
+        </p:nvCxnSpPr>
+        <p:spPr>
+          <a:xfrm flipV="1">
+            <a:off x="6299736" y="5803437"/>
+            <a:ext cx="2168892" cy="4813"/>
+          </a:xfrm>
+          <a:prstGeom prst="line">
+            <a:avLst/>
+          </a:prstGeom>
+          <a:ln w="38100">
+            <a:solidFill>
+              <a:srgbClr val="00B050"/>
+            </a:solidFill>
+          </a:ln>
+        </p:spPr>
+        <p:style>
+          <a:lnRef idx="1">
+            <a:schemeClr val="accent1"/>
+          </a:lnRef>
+          <a:fillRef idx="0">
+            <a:schemeClr val="accent1"/>
+          </a:fillRef>
+          <a:effectRef idx="0">
+            <a:schemeClr val="accent1"/>
+          </a:effectRef>
+          <a:fontRef idx="minor">
+            <a:schemeClr val="tx1"/>
+          </a:fontRef>
+        </p:style>
+      </p:cxnSp>
+      <p:cxnSp>
+        <p:nvCxnSpPr>
+          <p:cNvPr id="14" name="Straight Connector 13"/>
+          <p:cNvCxnSpPr/>
+          <p:nvPr/>
+        </p:nvCxnSpPr>
+        <p:spPr>
+          <a:xfrm flipV="1">
+            <a:off x="3237298" y="6360695"/>
+            <a:ext cx="2168892" cy="4813"/>
+          </a:xfrm>
+          <a:prstGeom prst="line">
+            <a:avLst/>
+          </a:prstGeom>
+          <a:ln w="38100">
+            <a:solidFill>
+              <a:srgbClr val="00B050"/>
+            </a:solidFill>
+          </a:ln>
+        </p:spPr>
+        <p:style>
+          <a:lnRef idx="1">
+            <a:schemeClr val="accent1"/>
+          </a:lnRef>
+          <a:fillRef idx="0">
+            <a:schemeClr val="accent1"/>
+          </a:fillRef>
+          <a:effectRef idx="0">
+            <a:schemeClr val="accent1"/>
+          </a:effectRef>
+          <a:fontRef idx="minor">
+            <a:schemeClr val="tx1"/>
+          </a:fontRef>
+        </p:style>
+      </p:cxnSp>
+      <p:cxnSp>
+        <p:nvCxnSpPr>
+          <p:cNvPr id="15" name="Straight Connector 14"/>
+          <p:cNvCxnSpPr/>
+          <p:nvPr/>
+        </p:nvCxnSpPr>
+        <p:spPr>
+          <a:xfrm flipV="1">
+            <a:off x="5406190" y="6657474"/>
+            <a:ext cx="2168892" cy="4813"/>
+          </a:xfrm>
+          <a:prstGeom prst="line">
+            <a:avLst/>
+          </a:prstGeom>
+          <a:ln w="38100">
+            <a:solidFill>
+              <a:srgbClr val="00B050"/>
+            </a:solidFill>
+          </a:ln>
+        </p:spPr>
+        <p:style>
+          <a:lnRef idx="1">
+            <a:schemeClr val="accent1"/>
+          </a:lnRef>
+          <a:fillRef idx="0">
+            <a:schemeClr val="accent1"/>
+          </a:fillRef>
+          <a:effectRef idx="0">
+            <a:schemeClr val="accent1"/>
+          </a:effectRef>
+          <a:fontRef idx="minor">
+            <a:schemeClr val="tx1"/>
+          </a:fontRef>
+        </p:style>
+      </p:cxnSp>
+    </p:spTree>
+    <p:extLst>
+      <p:ext uri="{BB962C8B-B14F-4D97-AF65-F5344CB8AC3E}">
+        <p14:creationId xmlns:p14="http://schemas.microsoft.com/office/powerpoint/2010/main" val="105847869"/>
+      </p:ext>
+    </p:extLst>
+  </p:cSld>
+  <p:clrMapOvr>
+    <a:masterClrMapping/>
+  </p:clrMapOvr>
+  <p:timing>
+    <p:tnLst>
+      <p:par>
+        <p:cTn id="1" dur="indefinite" restart="never" nodeType="tmRoot"/>
+      </p:par>
+    </p:tnLst>
+  </p:timing>
+</p:sld>
+</file>
+
+<file path=ppt/slides/slide19.xml><?xml version="1.0" encoding="utf-8"?>
+<p:sld xmlns:a="http://schemas.openxmlformats.org/drawingml/2006/main" xmlns:r="http://schemas.openxmlformats.org/officeDocument/2006/relationships" xmlns:p="http://schemas.openxmlformats.org/presentationml/2006/main">
+  <p:cSld>
+    <p:spTree>
+      <p:nvGrpSpPr>
+        <p:cNvPr id="1" name=""/>
+        <p:cNvGrpSpPr/>
+        <p:nvPr/>
+      </p:nvGrpSpPr>
+      <p:grpSpPr>
+        <a:xfrm>
+          <a:off x="0" y="0"/>
+          <a:ext cx="0" cy="0"/>
+          <a:chOff x="0" y="0"/>
+          <a:chExt cx="0" cy="0"/>
+        </a:xfrm>
+      </p:grpSpPr>
+      <p:sp>
+        <p:nvSpPr>
+          <p:cNvPr id="5" name="TextBox 4"/>
+          <p:cNvSpPr txBox="1"/>
+          <p:nvPr/>
+        </p:nvSpPr>
+        <p:spPr>
+          <a:xfrm>
+            <a:off x="0" y="0"/>
+            <a:ext cx="8134066" cy="523220"/>
+          </a:xfrm>
+          <a:prstGeom prst="rect">
+            <a:avLst/>
+          </a:prstGeom>
+        </p:spPr>
+        <p:txBody>
+          <a:bodyPr rtlCol="0">
+            <a:spAutoFit/>
+          </a:bodyPr>
+          <a:lstStyle/>
+          <a:p>
+            <a:r>
+              <a:rPr lang="en-US" sz="2800" dirty="0">
+                <a:solidFill>
+                  <a:srgbClr val="002060"/>
+                </a:solidFill>
+              </a:rPr>
+              <a:t>Bishop </a:t>
+            </a:r>
+            <a:r>
+              <a:rPr lang="en-US" sz="2800" dirty="0" smtClean="0">
+                <a:solidFill>
+                  <a:srgbClr val="002060"/>
+                </a:solidFill>
+              </a:rPr>
+              <a:t>13.3</a:t>
+            </a:r>
+            <a:endParaRPr lang="en-US" sz="2800" dirty="0">
+              <a:solidFill>
+                <a:srgbClr val="002060"/>
+              </a:solidFill>
+            </a:endParaRPr>
+          </a:p>
+        </p:txBody>
+      </p:sp>
+      <p:pic>
+        <p:nvPicPr>
+          <p:cNvPr id="7" name="Picture 6">
+            <a:extLst>
+              <a:ext uri="{FF2B5EF4-FFF2-40B4-BE49-F238E27FC236}">
+                <a16:creationId xmlns:a16="http://schemas.microsoft.com/office/drawing/2014/main" xmlns="" id="{A6077F45-7AD7-432D-927D-291CC17C3696}"/>
+              </a:ext>
+            </a:extLst>
+          </p:cNvPr>
+          <p:cNvPicPr>
+            <a:picLocks noChangeAspect="1"/>
+          </p:cNvPicPr>
+          <p:nvPr/>
+        </p:nvPicPr>
+        <p:blipFill>
+          <a:blip r:embed="rId3"/>
+          <a:stretch>
+            <a:fillRect/>
+          </a:stretch>
+        </p:blipFill>
+        <p:spPr>
+          <a:xfrm>
+            <a:off x="81814" y="584230"/>
+            <a:ext cx="8686800" cy="1251086"/>
+          </a:xfrm>
+          <a:prstGeom prst="rect">
+            <a:avLst/>
+          </a:prstGeom>
+        </p:spPr>
+      </p:pic>
+      <p:pic>
+        <p:nvPicPr>
+          <p:cNvPr id="8" name="Picture 7"/>
+          <p:cNvPicPr>
+            <a:picLocks noChangeAspect="1"/>
+          </p:cNvPicPr>
+          <p:nvPr/>
+        </p:nvPicPr>
+        <p:blipFill>
+          <a:blip r:embed="rId4"/>
+          <a:stretch>
+            <a:fillRect/>
+          </a:stretch>
+        </p:blipFill>
+        <p:spPr>
+          <a:xfrm>
+            <a:off x="2733574" y="2908432"/>
+            <a:ext cx="6217920" cy="3810414"/>
+          </a:xfrm>
+          <a:prstGeom prst="rect">
+            <a:avLst/>
+          </a:prstGeom>
+        </p:spPr>
+      </p:pic>
+      <p:pic>
+        <p:nvPicPr>
+          <p:cNvPr id="19" name="Picture 18">
+            <a:extLst>
+              <a:ext uri="{FF2B5EF4-FFF2-40B4-BE49-F238E27FC236}">
+                <a16:creationId xmlns:a16="http://schemas.microsoft.com/office/drawing/2014/main" xmlns="" id="{DEA99781-BDB5-4F5B-9266-CBC071484A5F}"/>
+              </a:ext>
+            </a:extLst>
+          </p:cNvPr>
+          <p:cNvPicPr>
+            <a:picLocks noChangeAspect="1"/>
+          </p:cNvPicPr>
+          <p:nvPr/>
+        </p:nvPicPr>
+        <p:blipFill>
+          <a:blip r:embed="rId5"/>
+          <a:stretch>
+            <a:fillRect/>
+          </a:stretch>
+        </p:blipFill>
+        <p:spPr>
+          <a:xfrm>
+            <a:off x="325655" y="1742467"/>
+            <a:ext cx="5486400" cy="1116510"/>
+          </a:xfrm>
+          <a:prstGeom prst="rect">
+            <a:avLst/>
+          </a:prstGeom>
+        </p:spPr>
+      </p:pic>
+      <p:cxnSp>
+        <p:nvCxnSpPr>
+          <p:cNvPr id="3" name="Straight Connector 2"/>
+          <p:cNvCxnSpPr/>
+          <p:nvPr/>
+        </p:nvCxnSpPr>
+        <p:spPr>
+          <a:xfrm>
+            <a:off x="5812055" y="952901"/>
+            <a:ext cx="1262513" cy="0"/>
+          </a:xfrm>
+          <a:prstGeom prst="line">
+            <a:avLst/>
+          </a:prstGeom>
+          <a:ln w="38100">
+            <a:solidFill>
+              <a:srgbClr val="00B050"/>
+            </a:solidFill>
+          </a:ln>
+        </p:spPr>
+        <p:style>
+          <a:lnRef idx="1">
+            <a:schemeClr val="accent1"/>
+          </a:lnRef>
+          <a:fillRef idx="0">
+            <a:schemeClr val="accent1"/>
+          </a:fillRef>
+          <a:effectRef idx="0">
+            <a:schemeClr val="accent1"/>
+          </a:effectRef>
+          <a:fontRef idx="minor">
+            <a:schemeClr val="tx1"/>
+          </a:fontRef>
+        </p:style>
+      </p:cxnSp>
+      <p:sp>
+        <p:nvSpPr>
+          <p:cNvPr id="21" name="TextBox 20"/>
+          <p:cNvSpPr txBox="1"/>
+          <p:nvPr/>
+        </p:nvSpPr>
+        <p:spPr>
+          <a:xfrm>
+            <a:off x="81814" y="3010233"/>
+            <a:ext cx="1981201" cy="3139321"/>
+          </a:xfrm>
+          <a:prstGeom prst="rect">
+            <a:avLst/>
+          </a:prstGeom>
+          <a:noFill/>
+        </p:spPr>
+        <p:txBody>
+          <a:bodyPr wrap="square" rtlCol="0">
+            <a:spAutoFit/>
+          </a:bodyPr>
+          <a:lstStyle/>
+          <a:p>
+            <a:r>
+              <a:rPr lang="en-US" dirty="0" smtClean="0">
+                <a:solidFill>
+                  <a:srgbClr val="00B050"/>
+                </a:solidFill>
+              </a:rPr>
+              <a:t>For all pairs of x</a:t>
+            </a:r>
+            <a:r>
+              <a:rPr lang="en-US" baseline="-25000" dirty="0" smtClean="0">
+                <a:solidFill>
+                  <a:srgbClr val="00B050"/>
+                </a:solidFill>
+              </a:rPr>
+              <a:t>i</a:t>
+            </a:r>
+            <a:r>
+              <a:rPr lang="en-US" dirty="0" smtClean="0">
+                <a:solidFill>
+                  <a:srgbClr val="00B050"/>
+                </a:solidFill>
+              </a:rPr>
+              <a:t>, the path that must be traversed to get from one x node to another goes through z nodes, and the arrows on the path meet in tail-to-tail relationships at these nodes.</a:t>
+            </a:r>
+          </a:p>
+        </p:txBody>
+      </p:sp>
+      <p:cxnSp>
+        <p:nvCxnSpPr>
+          <p:cNvPr id="9" name="Straight Connector 8"/>
+          <p:cNvCxnSpPr/>
+          <p:nvPr/>
+        </p:nvCxnSpPr>
+        <p:spPr>
+          <a:xfrm flipV="1">
+            <a:off x="5868202" y="4350619"/>
+            <a:ext cx="2900412" cy="8022"/>
+          </a:xfrm>
+          <a:prstGeom prst="line">
+            <a:avLst/>
+          </a:prstGeom>
+          <a:ln w="38100">
+            <a:solidFill>
+              <a:srgbClr val="00B050"/>
+            </a:solidFill>
+          </a:ln>
+        </p:spPr>
+        <p:style>
+          <a:lnRef idx="1">
+            <a:schemeClr val="accent1"/>
+          </a:lnRef>
+          <a:fillRef idx="0">
+            <a:schemeClr val="accent1"/>
+          </a:fillRef>
+          <a:effectRef idx="0">
+            <a:schemeClr val="accent1"/>
+          </a:effectRef>
+          <a:fontRef idx="minor">
+            <a:schemeClr val="tx1"/>
+          </a:fontRef>
+        </p:style>
+      </p:cxnSp>
+      <p:cxnSp>
+        <p:nvCxnSpPr>
+          <p:cNvPr id="10" name="Straight Connector 9"/>
+          <p:cNvCxnSpPr/>
+          <p:nvPr/>
+        </p:nvCxnSpPr>
+        <p:spPr>
+          <a:xfrm>
+            <a:off x="3542899" y="4626544"/>
+            <a:ext cx="1635493" cy="22458"/>
+          </a:xfrm>
+          <a:prstGeom prst="line">
+            <a:avLst/>
+          </a:prstGeom>
+          <a:ln w="38100">
+            <a:solidFill>
+              <a:srgbClr val="00B050"/>
+            </a:solidFill>
+          </a:ln>
+        </p:spPr>
+        <p:style>
+          <a:lnRef idx="1">
+            <a:schemeClr val="accent1"/>
+          </a:lnRef>
+          <a:fillRef idx="0">
+            <a:schemeClr val="accent1"/>
+          </a:fillRef>
+          <a:effectRef idx="0">
+            <a:schemeClr val="accent1"/>
+          </a:effectRef>
+          <a:fontRef idx="minor">
+            <a:schemeClr val="tx1"/>
+          </a:fontRef>
+        </p:style>
+      </p:cxnSp>
+    </p:spTree>
+    <p:extLst>
+      <p:ext uri="{BB962C8B-B14F-4D97-AF65-F5344CB8AC3E}">
+        <p14:creationId xmlns:p14="http://schemas.microsoft.com/office/powerpoint/2010/main" val="925472635"/>
+      </p:ext>
+    </p:extLst>
+  </p:cSld>
+  <p:clrMapOvr>
+    <a:masterClrMapping/>
+  </p:clrMapOvr>
+  <p:timing>
+    <p:tnLst>
+      <p:par>
+        <p:cTn id="1" dur="indefinite" restart="never" nodeType="tmRoot"/>
+      </p:par>
+    </p:tnLst>
+  </p:timing>
 </p:sld>
 </file>
 
@@ -6880,7 +9172,7 @@
           <p:cNvPr id="3" name="Group 2">
             <a:extLst>
               <a:ext uri="{FF2B5EF4-FFF2-40B4-BE49-F238E27FC236}">
-                <a16:creationId xmlns:a16="http://schemas.microsoft.com/office/drawing/2014/main" id="{0BD80C54-311B-4792-A718-4BF59A475D65}"/>
+                <a16:creationId xmlns:a16="http://schemas.microsoft.com/office/drawing/2014/main" xmlns="" id="{0BD80C54-311B-4792-A718-4BF59A475D65}"/>
               </a:ext>
             </a:extLst>
           </p:cNvPr>
@@ -6900,7 +9192,7 @@
             <p:cNvPr id="2" name="Picture 1">
               <a:extLst>
                 <a:ext uri="{FF2B5EF4-FFF2-40B4-BE49-F238E27FC236}">
-                  <a16:creationId xmlns:a16="http://schemas.microsoft.com/office/drawing/2014/main" id="{FA2C4E8D-88A9-4982-AD44-E3C32980898D}"/>
+                  <a16:creationId xmlns:a16="http://schemas.microsoft.com/office/drawing/2014/main" xmlns="" id="{FA2C4E8D-88A9-4982-AD44-E3C32980898D}"/>
                 </a:ext>
               </a:extLst>
             </p:cNvPr>
@@ -6930,7 +9222,7 @@
             <p:cNvPr id="6" name="Picture 5">
               <a:extLst>
                 <a:ext uri="{FF2B5EF4-FFF2-40B4-BE49-F238E27FC236}">
-                  <a16:creationId xmlns:a16="http://schemas.microsoft.com/office/drawing/2014/main" id="{613DDEE8-183B-428E-8AE0-3F382A94B758}"/>
+                  <a16:creationId xmlns:a16="http://schemas.microsoft.com/office/drawing/2014/main" xmlns="" id="{613DDEE8-183B-428E-8AE0-3F382A94B758}"/>
                 </a:ext>
               </a:extLst>
             </p:cNvPr>
@@ -6961,7 +9253,7 @@
           <p:cNvPr id="7" name="Picture 6">
             <a:extLst>
               <a:ext uri="{FF2B5EF4-FFF2-40B4-BE49-F238E27FC236}">
-                <a16:creationId xmlns:a16="http://schemas.microsoft.com/office/drawing/2014/main" id="{5F3BC569-B08C-494A-B723-53DB1E2F9D04}"/>
+                <a16:creationId xmlns:a16="http://schemas.microsoft.com/office/drawing/2014/main" xmlns="" id="{5F3BC569-B08C-494A-B723-53DB1E2F9D04}"/>
               </a:ext>
             </a:extLst>
           </p:cNvPr>
@@ -6991,7 +9283,7 @@
           <p:cNvPr id="8" name="TextBox 7">
             <a:extLst>
               <a:ext uri="{FF2B5EF4-FFF2-40B4-BE49-F238E27FC236}">
-                <a16:creationId xmlns:a16="http://schemas.microsoft.com/office/drawing/2014/main" id="{75B44792-BAE6-4922-8A89-543AB9C4DC72}"/>
+                <a16:creationId xmlns:a16="http://schemas.microsoft.com/office/drawing/2014/main" xmlns="" id="{75B44792-BAE6-4922-8A89-543AB9C4DC72}"/>
               </a:ext>
             </a:extLst>
           </p:cNvPr>
@@ -7026,7 +9318,7 @@
           <p:cNvPr id="9" name="Picture 8">
             <a:extLst>
               <a:ext uri="{FF2B5EF4-FFF2-40B4-BE49-F238E27FC236}">
-                <a16:creationId xmlns:a16="http://schemas.microsoft.com/office/drawing/2014/main" id="{09261933-A016-4C4B-A7BA-7E585575BA16}"/>
+                <a16:creationId xmlns:a16="http://schemas.microsoft.com/office/drawing/2014/main" xmlns="" id="{09261933-A016-4C4B-A7BA-7E585575BA16}"/>
               </a:ext>
             </a:extLst>
           </p:cNvPr>
@@ -7056,7 +9348,7 @@
           <p:cNvPr id="10" name="TextBox 9">
             <a:extLst>
               <a:ext uri="{FF2B5EF4-FFF2-40B4-BE49-F238E27FC236}">
-                <a16:creationId xmlns:a16="http://schemas.microsoft.com/office/drawing/2014/main" id="{C6FFEA1D-45D0-416E-A1C6-383D9BBF6B9D}"/>
+                <a16:creationId xmlns:a16="http://schemas.microsoft.com/office/drawing/2014/main" xmlns="" id="{C6FFEA1D-45D0-416E-A1C6-383D9BBF6B9D}"/>
               </a:ext>
             </a:extLst>
           </p:cNvPr>
@@ -7096,6 +9388,752 @@
   <p:clrMapOvr>
     <a:masterClrMapping/>
   </p:clrMapOvr>
+  <p:timing>
+    <p:tnLst>
+      <p:par>
+        <p:cTn id="1" dur="indefinite" restart="never" nodeType="tmRoot"/>
+      </p:par>
+    </p:tnLst>
+  </p:timing>
+</p:sld>
+</file>
+
+<file path=ppt/slides/slide20.xml><?xml version="1.0" encoding="utf-8"?>
+<p:sld xmlns:a="http://schemas.openxmlformats.org/drawingml/2006/main" xmlns:r="http://schemas.openxmlformats.org/officeDocument/2006/relationships" xmlns:p="http://schemas.openxmlformats.org/presentationml/2006/main">
+  <p:cSld>
+    <p:spTree>
+      <p:nvGrpSpPr>
+        <p:cNvPr id="1" name=""/>
+        <p:cNvGrpSpPr/>
+        <p:nvPr/>
+      </p:nvGrpSpPr>
+      <p:grpSpPr>
+        <a:xfrm>
+          <a:off x="0" y="0"/>
+          <a:ext cx="0" cy="0"/>
+          <a:chOff x="0" y="0"/>
+          <a:chExt cx="0" cy="0"/>
+        </a:xfrm>
+      </p:grpSpPr>
+      <p:sp>
+        <p:nvSpPr>
+          <p:cNvPr id="5" name="TextBox 4"/>
+          <p:cNvSpPr txBox="1"/>
+          <p:nvPr/>
+        </p:nvSpPr>
+        <p:spPr>
+          <a:xfrm>
+            <a:off x="0" y="0"/>
+            <a:ext cx="8134066" cy="523220"/>
+          </a:xfrm>
+          <a:prstGeom prst="rect">
+            <a:avLst/>
+          </a:prstGeom>
+        </p:spPr>
+        <p:txBody>
+          <a:bodyPr rtlCol="0">
+            <a:spAutoFit/>
+          </a:bodyPr>
+          <a:lstStyle/>
+          <a:p>
+            <a:r>
+              <a:rPr lang="en-US" sz="2800" dirty="0">
+                <a:solidFill>
+                  <a:srgbClr val="002060"/>
+                </a:solidFill>
+              </a:rPr>
+              <a:t>Bishop </a:t>
+            </a:r>
+            <a:r>
+              <a:rPr lang="en-US" sz="2800" dirty="0" smtClean="0">
+                <a:solidFill>
+                  <a:srgbClr val="002060"/>
+                </a:solidFill>
+              </a:rPr>
+              <a:t>13.3</a:t>
+            </a:r>
+            <a:endParaRPr lang="en-US" sz="2800" dirty="0">
+              <a:solidFill>
+                <a:srgbClr val="002060"/>
+              </a:solidFill>
+            </a:endParaRPr>
+          </a:p>
+        </p:txBody>
+      </p:sp>
+      <p:pic>
+        <p:nvPicPr>
+          <p:cNvPr id="7" name="Picture 6">
+            <a:extLst>
+              <a:ext uri="{FF2B5EF4-FFF2-40B4-BE49-F238E27FC236}">
+                <a16:creationId xmlns:a16="http://schemas.microsoft.com/office/drawing/2014/main" xmlns="" id="{A6077F45-7AD7-432D-927D-291CC17C3696}"/>
+              </a:ext>
+            </a:extLst>
+          </p:cNvPr>
+          <p:cNvPicPr>
+            <a:picLocks noChangeAspect="1"/>
+          </p:cNvPicPr>
+          <p:nvPr/>
+        </p:nvPicPr>
+        <p:blipFill>
+          <a:blip r:embed="rId3"/>
+          <a:stretch>
+            <a:fillRect/>
+          </a:stretch>
+        </p:blipFill>
+        <p:spPr>
+          <a:xfrm>
+            <a:off x="81814" y="584230"/>
+            <a:ext cx="8686800" cy="1251086"/>
+          </a:xfrm>
+          <a:prstGeom prst="rect">
+            <a:avLst/>
+          </a:prstGeom>
+        </p:spPr>
+      </p:pic>
+      <p:pic>
+        <p:nvPicPr>
+          <p:cNvPr id="8" name="Picture 7"/>
+          <p:cNvPicPr>
+            <a:picLocks noChangeAspect="1"/>
+          </p:cNvPicPr>
+          <p:nvPr/>
+        </p:nvPicPr>
+        <p:blipFill>
+          <a:blip r:embed="rId4"/>
+          <a:stretch>
+            <a:fillRect/>
+          </a:stretch>
+        </p:blipFill>
+        <p:spPr>
+          <a:xfrm>
+            <a:off x="2733574" y="2908432"/>
+            <a:ext cx="6217920" cy="3810414"/>
+          </a:xfrm>
+          <a:prstGeom prst="rect">
+            <a:avLst/>
+          </a:prstGeom>
+        </p:spPr>
+      </p:pic>
+      <p:pic>
+        <p:nvPicPr>
+          <p:cNvPr id="19" name="Picture 18">
+            <a:extLst>
+              <a:ext uri="{FF2B5EF4-FFF2-40B4-BE49-F238E27FC236}">
+                <a16:creationId xmlns:a16="http://schemas.microsoft.com/office/drawing/2014/main" xmlns="" id="{DEA99781-BDB5-4F5B-9266-CBC071484A5F}"/>
+              </a:ext>
+            </a:extLst>
+          </p:cNvPr>
+          <p:cNvPicPr>
+            <a:picLocks noChangeAspect="1"/>
+          </p:cNvPicPr>
+          <p:nvPr/>
+        </p:nvPicPr>
+        <p:blipFill>
+          <a:blip r:embed="rId5"/>
+          <a:stretch>
+            <a:fillRect/>
+          </a:stretch>
+        </p:blipFill>
+        <p:spPr>
+          <a:xfrm>
+            <a:off x="325655" y="1742467"/>
+            <a:ext cx="5486400" cy="1116510"/>
+          </a:xfrm>
+          <a:prstGeom prst="rect">
+            <a:avLst/>
+          </a:prstGeom>
+        </p:spPr>
+      </p:pic>
+      <p:cxnSp>
+        <p:nvCxnSpPr>
+          <p:cNvPr id="3" name="Straight Connector 2"/>
+          <p:cNvCxnSpPr/>
+          <p:nvPr/>
+        </p:nvCxnSpPr>
+        <p:spPr>
+          <a:xfrm>
+            <a:off x="5812055" y="952901"/>
+            <a:ext cx="1262513" cy="0"/>
+          </a:xfrm>
+          <a:prstGeom prst="line">
+            <a:avLst/>
+          </a:prstGeom>
+          <a:ln w="38100">
+            <a:solidFill>
+              <a:srgbClr val="00B050"/>
+            </a:solidFill>
+          </a:ln>
+        </p:spPr>
+        <p:style>
+          <a:lnRef idx="1">
+            <a:schemeClr val="accent1"/>
+          </a:lnRef>
+          <a:fillRef idx="0">
+            <a:schemeClr val="accent1"/>
+          </a:fillRef>
+          <a:effectRef idx="0">
+            <a:schemeClr val="accent1"/>
+          </a:effectRef>
+          <a:fontRef idx="minor">
+            <a:schemeClr val="tx1"/>
+          </a:fontRef>
+        </p:style>
+      </p:cxnSp>
+      <p:sp>
+        <p:nvSpPr>
+          <p:cNvPr id="21" name="TextBox 20"/>
+          <p:cNvSpPr txBox="1"/>
+          <p:nvPr/>
+        </p:nvSpPr>
+        <p:spPr>
+          <a:xfrm>
+            <a:off x="81814" y="3010233"/>
+            <a:ext cx="1981201" cy="2585323"/>
+          </a:xfrm>
+          <a:prstGeom prst="rect">
+            <a:avLst/>
+          </a:prstGeom>
+          <a:noFill/>
+        </p:spPr>
+        <p:txBody>
+          <a:bodyPr wrap="square" rtlCol="0">
+            <a:spAutoFit/>
+          </a:bodyPr>
+          <a:lstStyle/>
+          <a:p>
+            <a:r>
+              <a:rPr lang="en-US" dirty="0" smtClean="0">
+                <a:solidFill>
+                  <a:srgbClr val="00B050"/>
+                </a:solidFill>
+              </a:rPr>
+              <a:t>For such a path to be considered “blocked”, the nodes along the path must be in a “conditioning set” C – which means that they must be observable. </a:t>
+            </a:r>
+          </a:p>
+        </p:txBody>
+      </p:sp>
+      <p:cxnSp>
+        <p:nvCxnSpPr>
+          <p:cNvPr id="9" name="Straight Connector 8"/>
+          <p:cNvCxnSpPr/>
+          <p:nvPr/>
+        </p:nvCxnSpPr>
+        <p:spPr>
+          <a:xfrm flipV="1">
+            <a:off x="5406189" y="4649002"/>
+            <a:ext cx="2900412" cy="8022"/>
+          </a:xfrm>
+          <a:prstGeom prst="line">
+            <a:avLst/>
+          </a:prstGeom>
+          <a:ln w="38100">
+            <a:solidFill>
+              <a:srgbClr val="00B050"/>
+            </a:solidFill>
+          </a:ln>
+        </p:spPr>
+        <p:style>
+          <a:lnRef idx="1">
+            <a:schemeClr val="accent1"/>
+          </a:lnRef>
+          <a:fillRef idx="0">
+            <a:schemeClr val="accent1"/>
+          </a:fillRef>
+          <a:effectRef idx="0">
+            <a:schemeClr val="accent1"/>
+          </a:effectRef>
+          <a:fontRef idx="minor">
+            <a:schemeClr val="tx1"/>
+          </a:fontRef>
+        </p:style>
+      </p:cxnSp>
+    </p:spTree>
+    <p:extLst>
+      <p:ext uri="{BB962C8B-B14F-4D97-AF65-F5344CB8AC3E}">
+        <p14:creationId xmlns:p14="http://schemas.microsoft.com/office/powerpoint/2010/main" val="1558012418"/>
+      </p:ext>
+    </p:extLst>
+  </p:cSld>
+  <p:clrMapOvr>
+    <a:masterClrMapping/>
+  </p:clrMapOvr>
+  <p:timing>
+    <p:tnLst>
+      <p:par>
+        <p:cTn id="1" dur="indefinite" restart="never" nodeType="tmRoot"/>
+      </p:par>
+    </p:tnLst>
+  </p:timing>
+</p:sld>
+</file>
+
+<file path=ppt/slides/slide21.xml><?xml version="1.0" encoding="utf-8"?>
+<p:sld xmlns:a="http://schemas.openxmlformats.org/drawingml/2006/main" xmlns:r="http://schemas.openxmlformats.org/officeDocument/2006/relationships" xmlns:p="http://schemas.openxmlformats.org/presentationml/2006/main">
+  <p:cSld>
+    <p:spTree>
+      <p:nvGrpSpPr>
+        <p:cNvPr id="1" name=""/>
+        <p:cNvGrpSpPr/>
+        <p:nvPr/>
+      </p:nvGrpSpPr>
+      <p:grpSpPr>
+        <a:xfrm>
+          <a:off x="0" y="0"/>
+          <a:ext cx="0" cy="0"/>
+          <a:chOff x="0" y="0"/>
+          <a:chExt cx="0" cy="0"/>
+        </a:xfrm>
+      </p:grpSpPr>
+      <p:sp>
+        <p:nvSpPr>
+          <p:cNvPr id="5" name="TextBox 4"/>
+          <p:cNvSpPr txBox="1"/>
+          <p:nvPr/>
+        </p:nvSpPr>
+        <p:spPr>
+          <a:xfrm>
+            <a:off x="0" y="0"/>
+            <a:ext cx="8134066" cy="523220"/>
+          </a:xfrm>
+          <a:prstGeom prst="rect">
+            <a:avLst/>
+          </a:prstGeom>
+        </p:spPr>
+        <p:txBody>
+          <a:bodyPr rtlCol="0">
+            <a:spAutoFit/>
+          </a:bodyPr>
+          <a:lstStyle/>
+          <a:p>
+            <a:r>
+              <a:rPr lang="en-US" sz="2800" dirty="0">
+                <a:solidFill>
+                  <a:srgbClr val="002060"/>
+                </a:solidFill>
+              </a:rPr>
+              <a:t>Bishop </a:t>
+            </a:r>
+            <a:r>
+              <a:rPr lang="en-US" sz="2800" dirty="0" smtClean="0">
+                <a:solidFill>
+                  <a:srgbClr val="002060"/>
+                </a:solidFill>
+              </a:rPr>
+              <a:t>13.3</a:t>
+            </a:r>
+            <a:endParaRPr lang="en-US" sz="2800" dirty="0">
+              <a:solidFill>
+                <a:srgbClr val="002060"/>
+              </a:solidFill>
+            </a:endParaRPr>
+          </a:p>
+        </p:txBody>
+      </p:sp>
+      <p:pic>
+        <p:nvPicPr>
+          <p:cNvPr id="7" name="Picture 6">
+            <a:extLst>
+              <a:ext uri="{FF2B5EF4-FFF2-40B4-BE49-F238E27FC236}">
+                <a16:creationId xmlns:a16="http://schemas.microsoft.com/office/drawing/2014/main" xmlns="" id="{A6077F45-7AD7-432D-927D-291CC17C3696}"/>
+              </a:ext>
+            </a:extLst>
+          </p:cNvPr>
+          <p:cNvPicPr>
+            <a:picLocks noChangeAspect="1"/>
+          </p:cNvPicPr>
+          <p:nvPr/>
+        </p:nvPicPr>
+        <p:blipFill>
+          <a:blip r:embed="rId3"/>
+          <a:stretch>
+            <a:fillRect/>
+          </a:stretch>
+        </p:blipFill>
+        <p:spPr>
+          <a:xfrm>
+            <a:off x="81814" y="584230"/>
+            <a:ext cx="8686800" cy="1251086"/>
+          </a:xfrm>
+          <a:prstGeom prst="rect">
+            <a:avLst/>
+          </a:prstGeom>
+        </p:spPr>
+      </p:pic>
+      <p:pic>
+        <p:nvPicPr>
+          <p:cNvPr id="8" name="Picture 7"/>
+          <p:cNvPicPr>
+            <a:picLocks noChangeAspect="1"/>
+          </p:cNvPicPr>
+          <p:nvPr/>
+        </p:nvPicPr>
+        <p:blipFill>
+          <a:blip r:embed="rId4"/>
+          <a:stretch>
+            <a:fillRect/>
+          </a:stretch>
+        </p:blipFill>
+        <p:spPr>
+          <a:xfrm>
+            <a:off x="2733574" y="2908432"/>
+            <a:ext cx="6217920" cy="3810414"/>
+          </a:xfrm>
+          <a:prstGeom prst="rect">
+            <a:avLst/>
+          </a:prstGeom>
+        </p:spPr>
+      </p:pic>
+      <p:pic>
+        <p:nvPicPr>
+          <p:cNvPr id="19" name="Picture 18">
+            <a:extLst>
+              <a:ext uri="{FF2B5EF4-FFF2-40B4-BE49-F238E27FC236}">
+                <a16:creationId xmlns:a16="http://schemas.microsoft.com/office/drawing/2014/main" xmlns="" id="{DEA99781-BDB5-4F5B-9266-CBC071484A5F}"/>
+              </a:ext>
+            </a:extLst>
+          </p:cNvPr>
+          <p:cNvPicPr>
+            <a:picLocks noChangeAspect="1"/>
+          </p:cNvPicPr>
+          <p:nvPr/>
+        </p:nvPicPr>
+        <p:blipFill>
+          <a:blip r:embed="rId5"/>
+          <a:stretch>
+            <a:fillRect/>
+          </a:stretch>
+        </p:blipFill>
+        <p:spPr>
+          <a:xfrm>
+            <a:off x="325655" y="1742467"/>
+            <a:ext cx="5486400" cy="1116510"/>
+          </a:xfrm>
+          <a:prstGeom prst="rect">
+            <a:avLst/>
+          </a:prstGeom>
+        </p:spPr>
+      </p:pic>
+      <p:cxnSp>
+        <p:nvCxnSpPr>
+          <p:cNvPr id="3" name="Straight Connector 2"/>
+          <p:cNvCxnSpPr/>
+          <p:nvPr/>
+        </p:nvCxnSpPr>
+        <p:spPr>
+          <a:xfrm>
+            <a:off x="5812055" y="952901"/>
+            <a:ext cx="1262513" cy="0"/>
+          </a:xfrm>
+          <a:prstGeom prst="line">
+            <a:avLst/>
+          </a:prstGeom>
+          <a:ln w="38100">
+            <a:solidFill>
+              <a:srgbClr val="00B050"/>
+            </a:solidFill>
+          </a:ln>
+        </p:spPr>
+        <p:style>
+          <a:lnRef idx="1">
+            <a:schemeClr val="accent1"/>
+          </a:lnRef>
+          <a:fillRef idx="0">
+            <a:schemeClr val="accent1"/>
+          </a:fillRef>
+          <a:effectRef idx="0">
+            <a:schemeClr val="accent1"/>
+          </a:effectRef>
+          <a:fontRef idx="minor">
+            <a:schemeClr val="tx1"/>
+          </a:fontRef>
+        </p:style>
+      </p:cxnSp>
+      <p:sp>
+        <p:nvSpPr>
+          <p:cNvPr id="21" name="TextBox 20"/>
+          <p:cNvSpPr txBox="1"/>
+          <p:nvPr/>
+        </p:nvSpPr>
+        <p:spPr>
+          <a:xfrm>
+            <a:off x="81814" y="3010233"/>
+            <a:ext cx="1981201" cy="3416320"/>
+          </a:xfrm>
+          <a:prstGeom prst="rect">
+            <a:avLst/>
+          </a:prstGeom>
+          <a:noFill/>
+        </p:spPr>
+        <p:txBody>
+          <a:bodyPr wrap="square" rtlCol="0">
+            <a:spAutoFit/>
+          </a:bodyPr>
+          <a:lstStyle/>
+          <a:p>
+            <a:r>
+              <a:rPr lang="en-US" dirty="0" smtClean="0">
+                <a:solidFill>
+                  <a:srgbClr val="00B050"/>
+                </a:solidFill>
+              </a:rPr>
+              <a:t>However, the nodes along the path are all latent “z” nodes, which can’t be observed, and therefore can’t be in a conditioning set C.  Therefore, none of the x variables can be d-separated from each other.</a:t>
+            </a:r>
+          </a:p>
+        </p:txBody>
+      </p:sp>
+      <p:cxnSp>
+        <p:nvCxnSpPr>
+          <p:cNvPr id="9" name="Straight Connector 8"/>
+          <p:cNvCxnSpPr/>
+          <p:nvPr/>
+        </p:nvCxnSpPr>
+        <p:spPr>
+          <a:xfrm flipV="1">
+            <a:off x="5406189" y="4649002"/>
+            <a:ext cx="2900412" cy="8022"/>
+          </a:xfrm>
+          <a:prstGeom prst="line">
+            <a:avLst/>
+          </a:prstGeom>
+          <a:ln w="38100">
+            <a:solidFill>
+              <a:srgbClr val="00B050"/>
+            </a:solidFill>
+          </a:ln>
+        </p:spPr>
+        <p:style>
+          <a:lnRef idx="1">
+            <a:schemeClr val="accent1"/>
+          </a:lnRef>
+          <a:fillRef idx="0">
+            <a:schemeClr val="accent1"/>
+          </a:fillRef>
+          <a:effectRef idx="0">
+            <a:schemeClr val="accent1"/>
+          </a:effectRef>
+          <a:fontRef idx="minor">
+            <a:schemeClr val="tx1"/>
+          </a:fontRef>
+        </p:style>
+      </p:cxnSp>
+    </p:spTree>
+    <p:extLst>
+      <p:ext uri="{BB962C8B-B14F-4D97-AF65-F5344CB8AC3E}">
+        <p14:creationId xmlns:p14="http://schemas.microsoft.com/office/powerpoint/2010/main" val="3194105347"/>
+      </p:ext>
+    </p:extLst>
+  </p:cSld>
+  <p:clrMapOvr>
+    <a:masterClrMapping/>
+  </p:clrMapOvr>
+  <p:timing>
+    <p:tnLst>
+      <p:par>
+        <p:cTn id="1" dur="indefinite" restart="never" nodeType="tmRoot"/>
+      </p:par>
+    </p:tnLst>
+  </p:timing>
+</p:sld>
+</file>
+
+<file path=ppt/slides/slide22.xml><?xml version="1.0" encoding="utf-8"?>
+<p:sld xmlns:a="http://schemas.openxmlformats.org/drawingml/2006/main" xmlns:r="http://schemas.openxmlformats.org/officeDocument/2006/relationships" xmlns:p="http://schemas.openxmlformats.org/presentationml/2006/main">
+  <p:cSld>
+    <p:spTree>
+      <p:nvGrpSpPr>
+        <p:cNvPr id="1" name=""/>
+        <p:cNvGrpSpPr/>
+        <p:nvPr/>
+      </p:nvGrpSpPr>
+      <p:grpSpPr>
+        <a:xfrm>
+          <a:off x="0" y="0"/>
+          <a:ext cx="0" cy="0"/>
+          <a:chOff x="0" y="0"/>
+          <a:chExt cx="0" cy="0"/>
+        </a:xfrm>
+      </p:grpSpPr>
+      <p:sp>
+        <p:nvSpPr>
+          <p:cNvPr id="5" name="TextBox 4"/>
+          <p:cNvSpPr txBox="1"/>
+          <p:nvPr/>
+        </p:nvSpPr>
+        <p:spPr>
+          <a:xfrm>
+            <a:off x="0" y="0"/>
+            <a:ext cx="8134066" cy="523220"/>
+          </a:xfrm>
+          <a:prstGeom prst="rect">
+            <a:avLst/>
+          </a:prstGeom>
+        </p:spPr>
+        <p:txBody>
+          <a:bodyPr rtlCol="0">
+            <a:spAutoFit/>
+          </a:bodyPr>
+          <a:lstStyle/>
+          <a:p>
+            <a:r>
+              <a:rPr lang="en-US" sz="2800" dirty="0">
+                <a:solidFill>
+                  <a:srgbClr val="002060"/>
+                </a:solidFill>
+              </a:rPr>
+              <a:t>Bishop </a:t>
+            </a:r>
+            <a:r>
+              <a:rPr lang="en-US" sz="2800" dirty="0" smtClean="0">
+                <a:solidFill>
+                  <a:srgbClr val="002060"/>
+                </a:solidFill>
+              </a:rPr>
+              <a:t>13.3 with textbook solution</a:t>
+            </a:r>
+            <a:endParaRPr lang="en-US" sz="2800" dirty="0">
+              <a:solidFill>
+                <a:srgbClr val="002060"/>
+              </a:solidFill>
+            </a:endParaRPr>
+          </a:p>
+        </p:txBody>
+      </p:sp>
+      <p:pic>
+        <p:nvPicPr>
+          <p:cNvPr id="7" name="Picture 6">
+            <a:extLst>
+              <a:ext uri="{FF2B5EF4-FFF2-40B4-BE49-F238E27FC236}">
+                <a16:creationId xmlns:a16="http://schemas.microsoft.com/office/drawing/2014/main" xmlns="" id="{A6077F45-7AD7-432D-927D-291CC17C3696}"/>
+              </a:ext>
+            </a:extLst>
+          </p:cNvPr>
+          <p:cNvPicPr>
+            <a:picLocks noChangeAspect="1"/>
+          </p:cNvPicPr>
+          <p:nvPr/>
+        </p:nvPicPr>
+        <p:blipFill>
+          <a:blip r:embed="rId3"/>
+          <a:stretch>
+            <a:fillRect/>
+          </a:stretch>
+        </p:blipFill>
+        <p:spPr>
+          <a:xfrm>
+            <a:off x="81814" y="584230"/>
+            <a:ext cx="8686800" cy="1251086"/>
+          </a:xfrm>
+          <a:prstGeom prst="rect">
+            <a:avLst/>
+          </a:prstGeom>
+        </p:spPr>
+      </p:pic>
+      <p:pic>
+        <p:nvPicPr>
+          <p:cNvPr id="19" name="Picture 18">
+            <a:extLst>
+              <a:ext uri="{FF2B5EF4-FFF2-40B4-BE49-F238E27FC236}">
+                <a16:creationId xmlns:a16="http://schemas.microsoft.com/office/drawing/2014/main" xmlns="" id="{DEA99781-BDB5-4F5B-9266-CBC071484A5F}"/>
+              </a:ext>
+            </a:extLst>
+          </p:cNvPr>
+          <p:cNvPicPr>
+            <a:picLocks noChangeAspect="1"/>
+          </p:cNvPicPr>
+          <p:nvPr/>
+        </p:nvPicPr>
+        <p:blipFill>
+          <a:blip r:embed="rId4"/>
+          <a:stretch>
+            <a:fillRect/>
+          </a:stretch>
+        </p:blipFill>
+        <p:spPr>
+          <a:xfrm>
+            <a:off x="325655" y="1896326"/>
+            <a:ext cx="5486400" cy="1116510"/>
+          </a:xfrm>
+          <a:prstGeom prst="rect">
+            <a:avLst/>
+          </a:prstGeom>
+        </p:spPr>
+      </p:pic>
+      <p:cxnSp>
+        <p:nvCxnSpPr>
+          <p:cNvPr id="3" name="Straight Connector 2"/>
+          <p:cNvCxnSpPr/>
+          <p:nvPr/>
+        </p:nvCxnSpPr>
+        <p:spPr>
+          <a:xfrm>
+            <a:off x="5812055" y="952901"/>
+            <a:ext cx="1262513" cy="0"/>
+          </a:xfrm>
+          <a:prstGeom prst="line">
+            <a:avLst/>
+          </a:prstGeom>
+          <a:ln w="38100">
+            <a:solidFill>
+              <a:srgbClr val="00B050"/>
+            </a:solidFill>
+          </a:ln>
+        </p:spPr>
+        <p:style>
+          <a:lnRef idx="1">
+            <a:schemeClr val="accent1"/>
+          </a:lnRef>
+          <a:fillRef idx="0">
+            <a:schemeClr val="accent1"/>
+          </a:fillRef>
+          <a:effectRef idx="0">
+            <a:schemeClr val="accent1"/>
+          </a:effectRef>
+          <a:fontRef idx="minor">
+            <a:schemeClr val="tx1"/>
+          </a:fontRef>
+        </p:style>
+      </p:cxnSp>
+      <p:pic>
+        <p:nvPicPr>
+          <p:cNvPr id="2" name="Picture 1"/>
+          <p:cNvPicPr>
+            <a:picLocks noChangeAspect="1"/>
+          </p:cNvPicPr>
+          <p:nvPr/>
+        </p:nvPicPr>
+        <p:blipFill>
+          <a:blip r:embed="rId5"/>
+          <a:stretch>
+            <a:fillRect/>
+          </a:stretch>
+        </p:blipFill>
+        <p:spPr>
+          <a:xfrm>
+            <a:off x="0" y="3366534"/>
+            <a:ext cx="8798401" cy="1724871"/>
+          </a:xfrm>
+          <a:prstGeom prst="rect">
+            <a:avLst/>
+          </a:prstGeom>
+        </p:spPr>
+      </p:pic>
+    </p:spTree>
+    <p:extLst>
+      <p:ext uri="{BB962C8B-B14F-4D97-AF65-F5344CB8AC3E}">
+        <p14:creationId xmlns:p14="http://schemas.microsoft.com/office/powerpoint/2010/main" val="2200666120"/>
+      </p:ext>
+    </p:extLst>
+  </p:cSld>
+  <p:clrMapOvr>
+    <a:masterClrMapping/>
+  </p:clrMapOvr>
+  <p:timing>
+    <p:tnLst>
+      <p:par>
+        <p:cTn id="1" dur="indefinite" restart="never" nodeType="tmRoot"/>
+      </p:par>
+    </p:tnLst>
+  </p:timing>
 </p:sld>
 </file>
 
@@ -7121,7 +10159,7 @@
           <p:cNvPr id="2" name="Picture 1">
             <a:extLst>
               <a:ext uri="{FF2B5EF4-FFF2-40B4-BE49-F238E27FC236}">
-                <a16:creationId xmlns:a16="http://schemas.microsoft.com/office/drawing/2014/main" id="{FA2C4E8D-88A9-4982-AD44-E3C32980898D}"/>
+                <a16:creationId xmlns:a16="http://schemas.microsoft.com/office/drawing/2014/main" xmlns="" id="{FA2C4E8D-88A9-4982-AD44-E3C32980898D}"/>
               </a:ext>
             </a:extLst>
           </p:cNvPr>
@@ -7182,7 +10220,7 @@
           <p:cNvPr id="7" name="Picture 6">
             <a:extLst>
               <a:ext uri="{FF2B5EF4-FFF2-40B4-BE49-F238E27FC236}">
-                <a16:creationId xmlns:a16="http://schemas.microsoft.com/office/drawing/2014/main" id="{5F3BC569-B08C-494A-B723-53DB1E2F9D04}"/>
+                <a16:creationId xmlns:a16="http://schemas.microsoft.com/office/drawing/2014/main" xmlns="" id="{5F3BC569-B08C-494A-B723-53DB1E2F9D04}"/>
               </a:ext>
             </a:extLst>
           </p:cNvPr>
@@ -7212,7 +10250,7 @@
           <p:cNvPr id="8" name="TextBox 7">
             <a:extLst>
               <a:ext uri="{FF2B5EF4-FFF2-40B4-BE49-F238E27FC236}">
-                <a16:creationId xmlns:a16="http://schemas.microsoft.com/office/drawing/2014/main" id="{75B44792-BAE6-4922-8A89-543AB9C4DC72}"/>
+                <a16:creationId xmlns:a16="http://schemas.microsoft.com/office/drawing/2014/main" xmlns="" id="{75B44792-BAE6-4922-8A89-543AB9C4DC72}"/>
               </a:ext>
             </a:extLst>
           </p:cNvPr>
@@ -7247,7 +10285,7 @@
           <p:cNvPr id="11" name="Picture 10">
             <a:extLst>
               <a:ext uri="{FF2B5EF4-FFF2-40B4-BE49-F238E27FC236}">
-                <a16:creationId xmlns:a16="http://schemas.microsoft.com/office/drawing/2014/main" id="{BBF94052-31F9-42A3-88AC-D43FE42574FF}"/>
+                <a16:creationId xmlns:a16="http://schemas.microsoft.com/office/drawing/2014/main" xmlns="" id="{BBF94052-31F9-42A3-88AC-D43FE42574FF}"/>
               </a:ext>
             </a:extLst>
           </p:cNvPr>
@@ -7277,7 +10315,7 @@
           <p:cNvPr id="3" name="TextBox 2">
             <a:extLst>
               <a:ext uri="{FF2B5EF4-FFF2-40B4-BE49-F238E27FC236}">
-                <a16:creationId xmlns:a16="http://schemas.microsoft.com/office/drawing/2014/main" id="{8624BADD-0993-4FC8-AF95-E144BB9A0689}"/>
+                <a16:creationId xmlns:a16="http://schemas.microsoft.com/office/drawing/2014/main" xmlns="" id="{8624BADD-0993-4FC8-AF95-E144BB9A0689}"/>
               </a:ext>
             </a:extLst>
           </p:cNvPr>
@@ -7376,6 +10414,13 @@
   <p:clrMapOvr>
     <a:masterClrMapping/>
   </p:clrMapOvr>
+  <p:timing>
+    <p:tnLst>
+      <p:par>
+        <p:cTn id="1" dur="indefinite" restart="never" nodeType="tmRoot"/>
+      </p:par>
+    </p:tnLst>
+  </p:timing>
 </p:sld>
 </file>
 
@@ -7401,7 +10446,7 @@
           <p:cNvPr id="2" name="Picture 1">
             <a:extLst>
               <a:ext uri="{FF2B5EF4-FFF2-40B4-BE49-F238E27FC236}">
-                <a16:creationId xmlns:a16="http://schemas.microsoft.com/office/drawing/2014/main" id="{FA2C4E8D-88A9-4982-AD44-E3C32980898D}"/>
+                <a16:creationId xmlns:a16="http://schemas.microsoft.com/office/drawing/2014/main" xmlns="" id="{FA2C4E8D-88A9-4982-AD44-E3C32980898D}"/>
               </a:ext>
             </a:extLst>
           </p:cNvPr>
@@ -7462,7 +10507,7 @@
           <p:cNvPr id="7" name="Picture 6">
             <a:extLst>
               <a:ext uri="{FF2B5EF4-FFF2-40B4-BE49-F238E27FC236}">
-                <a16:creationId xmlns:a16="http://schemas.microsoft.com/office/drawing/2014/main" id="{5F3BC569-B08C-494A-B723-53DB1E2F9D04}"/>
+                <a16:creationId xmlns:a16="http://schemas.microsoft.com/office/drawing/2014/main" xmlns="" id="{5F3BC569-B08C-494A-B723-53DB1E2F9D04}"/>
               </a:ext>
             </a:extLst>
           </p:cNvPr>
@@ -7492,7 +10537,7 @@
           <p:cNvPr id="8" name="TextBox 7">
             <a:extLst>
               <a:ext uri="{FF2B5EF4-FFF2-40B4-BE49-F238E27FC236}">
-                <a16:creationId xmlns:a16="http://schemas.microsoft.com/office/drawing/2014/main" id="{75B44792-BAE6-4922-8A89-543AB9C4DC72}"/>
+                <a16:creationId xmlns:a16="http://schemas.microsoft.com/office/drawing/2014/main" xmlns="" id="{75B44792-BAE6-4922-8A89-543AB9C4DC72}"/>
               </a:ext>
             </a:extLst>
           </p:cNvPr>
@@ -7527,7 +10572,7 @@
           <p:cNvPr id="11" name="Picture 10">
             <a:extLst>
               <a:ext uri="{FF2B5EF4-FFF2-40B4-BE49-F238E27FC236}">
-                <a16:creationId xmlns:a16="http://schemas.microsoft.com/office/drawing/2014/main" id="{BBF94052-31F9-42A3-88AC-D43FE42574FF}"/>
+                <a16:creationId xmlns:a16="http://schemas.microsoft.com/office/drawing/2014/main" xmlns="" id="{BBF94052-31F9-42A3-88AC-D43FE42574FF}"/>
               </a:ext>
             </a:extLst>
           </p:cNvPr>
@@ -7557,7 +10602,7 @@
           <p:cNvPr id="3" name="TextBox 2">
             <a:extLst>
               <a:ext uri="{FF2B5EF4-FFF2-40B4-BE49-F238E27FC236}">
-                <a16:creationId xmlns:a16="http://schemas.microsoft.com/office/drawing/2014/main" id="{8624BADD-0993-4FC8-AF95-E144BB9A0689}"/>
+                <a16:creationId xmlns:a16="http://schemas.microsoft.com/office/drawing/2014/main" xmlns="" id="{8624BADD-0993-4FC8-AF95-E144BB9A0689}"/>
               </a:ext>
             </a:extLst>
           </p:cNvPr>
@@ -7596,7 +10641,7 @@
           <p:cNvPr id="4" name="Picture 3">
             <a:extLst>
               <a:ext uri="{FF2B5EF4-FFF2-40B4-BE49-F238E27FC236}">
-                <a16:creationId xmlns:a16="http://schemas.microsoft.com/office/drawing/2014/main" id="{3F44B69E-5434-4875-B0AC-F1F205EE195F}"/>
+                <a16:creationId xmlns:a16="http://schemas.microsoft.com/office/drawing/2014/main" xmlns="" id="{3F44B69E-5434-4875-B0AC-F1F205EE195F}"/>
               </a:ext>
             </a:extLst>
           </p:cNvPr>
@@ -7626,7 +10671,7 @@
           <p:cNvPr id="13" name="TextBox 12">
             <a:extLst>
               <a:ext uri="{FF2B5EF4-FFF2-40B4-BE49-F238E27FC236}">
-                <a16:creationId xmlns:a16="http://schemas.microsoft.com/office/drawing/2014/main" id="{49AA28EB-F131-46A3-AEBA-9D4CD234A6B9}"/>
+                <a16:creationId xmlns:a16="http://schemas.microsoft.com/office/drawing/2014/main" xmlns="" id="{49AA28EB-F131-46A3-AEBA-9D4CD234A6B9}"/>
               </a:ext>
             </a:extLst>
           </p:cNvPr>
@@ -7685,7 +10730,7 @@
           <p:cNvPr id="14" name="TextBox 13">
             <a:extLst>
               <a:ext uri="{FF2B5EF4-FFF2-40B4-BE49-F238E27FC236}">
-                <a16:creationId xmlns:a16="http://schemas.microsoft.com/office/drawing/2014/main" id="{8363A235-110D-4AAB-A1D9-082850753EA7}"/>
+                <a16:creationId xmlns:a16="http://schemas.microsoft.com/office/drawing/2014/main" xmlns="" id="{8363A235-110D-4AAB-A1D9-082850753EA7}"/>
               </a:ext>
             </a:extLst>
           </p:cNvPr>
@@ -7720,7 +10765,7 @@
           <p:cNvPr id="16" name="Picture 15">
             <a:extLst>
               <a:ext uri="{FF2B5EF4-FFF2-40B4-BE49-F238E27FC236}">
-                <a16:creationId xmlns:a16="http://schemas.microsoft.com/office/drawing/2014/main" id="{570E5887-5073-4BEF-8FA4-858F32F866C8}"/>
+                <a16:creationId xmlns:a16="http://schemas.microsoft.com/office/drawing/2014/main" xmlns="" id="{570E5887-5073-4BEF-8FA4-858F32F866C8}"/>
               </a:ext>
             </a:extLst>
           </p:cNvPr>
@@ -7755,6 +10800,13 @@
   <p:clrMapOvr>
     <a:masterClrMapping/>
   </p:clrMapOvr>
+  <p:timing>
+    <p:tnLst>
+      <p:par>
+        <p:cTn id="1" dur="indefinite" restart="never" nodeType="tmRoot"/>
+      </p:par>
+    </p:tnLst>
+  </p:timing>
 </p:sld>
 </file>
 
@@ -7780,7 +10832,7 @@
           <p:cNvPr id="2" name="Picture 1">
             <a:extLst>
               <a:ext uri="{FF2B5EF4-FFF2-40B4-BE49-F238E27FC236}">
-                <a16:creationId xmlns:a16="http://schemas.microsoft.com/office/drawing/2014/main" id="{FA2C4E8D-88A9-4982-AD44-E3C32980898D}"/>
+                <a16:creationId xmlns:a16="http://schemas.microsoft.com/office/drawing/2014/main" xmlns="" id="{FA2C4E8D-88A9-4982-AD44-E3C32980898D}"/>
               </a:ext>
             </a:extLst>
           </p:cNvPr>
@@ -7841,7 +10893,7 @@
           <p:cNvPr id="7" name="Picture 6">
             <a:extLst>
               <a:ext uri="{FF2B5EF4-FFF2-40B4-BE49-F238E27FC236}">
-                <a16:creationId xmlns:a16="http://schemas.microsoft.com/office/drawing/2014/main" id="{5F3BC569-B08C-494A-B723-53DB1E2F9D04}"/>
+                <a16:creationId xmlns:a16="http://schemas.microsoft.com/office/drawing/2014/main" xmlns="" id="{5F3BC569-B08C-494A-B723-53DB1E2F9D04}"/>
               </a:ext>
             </a:extLst>
           </p:cNvPr>
@@ -7871,7 +10923,7 @@
           <p:cNvPr id="8" name="TextBox 7">
             <a:extLst>
               <a:ext uri="{FF2B5EF4-FFF2-40B4-BE49-F238E27FC236}">
-                <a16:creationId xmlns:a16="http://schemas.microsoft.com/office/drawing/2014/main" id="{75B44792-BAE6-4922-8A89-543AB9C4DC72}"/>
+                <a16:creationId xmlns:a16="http://schemas.microsoft.com/office/drawing/2014/main" xmlns="" id="{75B44792-BAE6-4922-8A89-543AB9C4DC72}"/>
               </a:ext>
             </a:extLst>
           </p:cNvPr>
@@ -7906,7 +10958,7 @@
           <p:cNvPr id="11" name="Picture 10">
             <a:extLst>
               <a:ext uri="{FF2B5EF4-FFF2-40B4-BE49-F238E27FC236}">
-                <a16:creationId xmlns:a16="http://schemas.microsoft.com/office/drawing/2014/main" id="{BBF94052-31F9-42A3-88AC-D43FE42574FF}"/>
+                <a16:creationId xmlns:a16="http://schemas.microsoft.com/office/drawing/2014/main" xmlns="" id="{BBF94052-31F9-42A3-88AC-D43FE42574FF}"/>
               </a:ext>
             </a:extLst>
           </p:cNvPr>
@@ -7936,7 +10988,7 @@
           <p:cNvPr id="3" name="TextBox 2">
             <a:extLst>
               <a:ext uri="{FF2B5EF4-FFF2-40B4-BE49-F238E27FC236}">
-                <a16:creationId xmlns:a16="http://schemas.microsoft.com/office/drawing/2014/main" id="{8624BADD-0993-4FC8-AF95-E144BB9A0689}"/>
+                <a16:creationId xmlns:a16="http://schemas.microsoft.com/office/drawing/2014/main" xmlns="" id="{8624BADD-0993-4FC8-AF95-E144BB9A0689}"/>
               </a:ext>
             </a:extLst>
           </p:cNvPr>
@@ -8004,7 +11056,7 @@
           <p:cNvPr id="16" name="Picture 15">
             <a:extLst>
               <a:ext uri="{FF2B5EF4-FFF2-40B4-BE49-F238E27FC236}">
-                <a16:creationId xmlns:a16="http://schemas.microsoft.com/office/drawing/2014/main" id="{570E5887-5073-4BEF-8FA4-858F32F866C8}"/>
+                <a16:creationId xmlns:a16="http://schemas.microsoft.com/office/drawing/2014/main" xmlns="" id="{570E5887-5073-4BEF-8FA4-858F32F866C8}"/>
               </a:ext>
             </a:extLst>
           </p:cNvPr>
@@ -8034,7 +11086,7 @@
           <p:cNvPr id="6" name="Picture 5">
             <a:extLst>
               <a:ext uri="{FF2B5EF4-FFF2-40B4-BE49-F238E27FC236}">
-                <a16:creationId xmlns:a16="http://schemas.microsoft.com/office/drawing/2014/main" id="{4BB59830-EA33-4190-A6F0-A4505AD07222}"/>
+                <a16:creationId xmlns:a16="http://schemas.microsoft.com/office/drawing/2014/main" xmlns="" id="{4BB59830-EA33-4190-A6F0-A4505AD07222}"/>
               </a:ext>
             </a:extLst>
           </p:cNvPr>
@@ -8064,7 +11116,7 @@
           <p:cNvPr id="9" name="TextBox 8">
             <a:extLst>
               <a:ext uri="{FF2B5EF4-FFF2-40B4-BE49-F238E27FC236}">
-                <a16:creationId xmlns:a16="http://schemas.microsoft.com/office/drawing/2014/main" id="{AC0061F9-FDC9-427D-93C6-FE27D1E894B7}"/>
+                <a16:creationId xmlns:a16="http://schemas.microsoft.com/office/drawing/2014/main" xmlns="" id="{AC0061F9-FDC9-427D-93C6-FE27D1E894B7}"/>
               </a:ext>
             </a:extLst>
           </p:cNvPr>
@@ -8112,6 +11164,13 @@
   <p:clrMapOvr>
     <a:masterClrMapping/>
   </p:clrMapOvr>
+  <p:timing>
+    <p:tnLst>
+      <p:par>
+        <p:cTn id="1" dur="indefinite" restart="never" nodeType="tmRoot"/>
+      </p:par>
+    </p:tnLst>
+  </p:timing>
 </p:sld>
 </file>
 
@@ -8137,7 +11196,7 @@
           <p:cNvPr id="2" name="Picture 1">
             <a:extLst>
               <a:ext uri="{FF2B5EF4-FFF2-40B4-BE49-F238E27FC236}">
-                <a16:creationId xmlns:a16="http://schemas.microsoft.com/office/drawing/2014/main" id="{FA2C4E8D-88A9-4982-AD44-E3C32980898D}"/>
+                <a16:creationId xmlns:a16="http://schemas.microsoft.com/office/drawing/2014/main" xmlns="" id="{FA2C4E8D-88A9-4982-AD44-E3C32980898D}"/>
               </a:ext>
             </a:extLst>
           </p:cNvPr>
@@ -8198,7 +11257,7 @@
           <p:cNvPr id="7" name="Picture 6">
             <a:extLst>
               <a:ext uri="{FF2B5EF4-FFF2-40B4-BE49-F238E27FC236}">
-                <a16:creationId xmlns:a16="http://schemas.microsoft.com/office/drawing/2014/main" id="{5F3BC569-B08C-494A-B723-53DB1E2F9D04}"/>
+                <a16:creationId xmlns:a16="http://schemas.microsoft.com/office/drawing/2014/main" xmlns="" id="{5F3BC569-B08C-494A-B723-53DB1E2F9D04}"/>
               </a:ext>
             </a:extLst>
           </p:cNvPr>
@@ -8228,7 +11287,7 @@
           <p:cNvPr id="8" name="TextBox 7">
             <a:extLst>
               <a:ext uri="{FF2B5EF4-FFF2-40B4-BE49-F238E27FC236}">
-                <a16:creationId xmlns:a16="http://schemas.microsoft.com/office/drawing/2014/main" id="{75B44792-BAE6-4922-8A89-543AB9C4DC72}"/>
+                <a16:creationId xmlns:a16="http://schemas.microsoft.com/office/drawing/2014/main" xmlns="" id="{75B44792-BAE6-4922-8A89-543AB9C4DC72}"/>
               </a:ext>
             </a:extLst>
           </p:cNvPr>
@@ -8263,7 +11322,7 @@
           <p:cNvPr id="11" name="Picture 10">
             <a:extLst>
               <a:ext uri="{FF2B5EF4-FFF2-40B4-BE49-F238E27FC236}">
-                <a16:creationId xmlns:a16="http://schemas.microsoft.com/office/drawing/2014/main" id="{BBF94052-31F9-42A3-88AC-D43FE42574FF}"/>
+                <a16:creationId xmlns:a16="http://schemas.microsoft.com/office/drawing/2014/main" xmlns="" id="{BBF94052-31F9-42A3-88AC-D43FE42574FF}"/>
               </a:ext>
             </a:extLst>
           </p:cNvPr>
@@ -8293,7 +11352,7 @@
           <p:cNvPr id="3" name="TextBox 2">
             <a:extLst>
               <a:ext uri="{FF2B5EF4-FFF2-40B4-BE49-F238E27FC236}">
-                <a16:creationId xmlns:a16="http://schemas.microsoft.com/office/drawing/2014/main" id="{8624BADD-0993-4FC8-AF95-E144BB9A0689}"/>
+                <a16:creationId xmlns:a16="http://schemas.microsoft.com/office/drawing/2014/main" xmlns="" id="{8624BADD-0993-4FC8-AF95-E144BB9A0689}"/>
               </a:ext>
             </a:extLst>
           </p:cNvPr>
@@ -8343,7 +11402,7 @@
           <p:cNvPr id="16" name="Picture 15">
             <a:extLst>
               <a:ext uri="{FF2B5EF4-FFF2-40B4-BE49-F238E27FC236}">
-                <a16:creationId xmlns:a16="http://schemas.microsoft.com/office/drawing/2014/main" id="{570E5887-5073-4BEF-8FA4-858F32F866C8}"/>
+                <a16:creationId xmlns:a16="http://schemas.microsoft.com/office/drawing/2014/main" xmlns="" id="{570E5887-5073-4BEF-8FA4-858F32F866C8}"/>
               </a:ext>
             </a:extLst>
           </p:cNvPr>
@@ -8373,7 +11432,7 @@
           <p:cNvPr id="12" name="Group 11">
             <a:extLst>
               <a:ext uri="{FF2B5EF4-FFF2-40B4-BE49-F238E27FC236}">
-                <a16:creationId xmlns:a16="http://schemas.microsoft.com/office/drawing/2014/main" id="{CED2289B-1093-4418-9F90-99DE124CA243}"/>
+                <a16:creationId xmlns:a16="http://schemas.microsoft.com/office/drawing/2014/main" xmlns="" id="{CED2289B-1093-4418-9F90-99DE124CA243}"/>
               </a:ext>
             </a:extLst>
           </p:cNvPr>
@@ -8393,7 +11452,7 @@
             <p:cNvPr id="10" name="Picture 9">
               <a:extLst>
                 <a:ext uri="{FF2B5EF4-FFF2-40B4-BE49-F238E27FC236}">
-                  <a16:creationId xmlns:a16="http://schemas.microsoft.com/office/drawing/2014/main" id="{15F5A415-BE67-4701-B716-6C05F2153AD5}"/>
+                  <a16:creationId xmlns:a16="http://schemas.microsoft.com/office/drawing/2014/main" xmlns="" id="{15F5A415-BE67-4701-B716-6C05F2153AD5}"/>
                 </a:ext>
               </a:extLst>
             </p:cNvPr>
@@ -8423,7 +11482,7 @@
             <p:cNvPr id="13" name="TextBox 12">
               <a:extLst>
                 <a:ext uri="{FF2B5EF4-FFF2-40B4-BE49-F238E27FC236}">
-                  <a16:creationId xmlns:a16="http://schemas.microsoft.com/office/drawing/2014/main" id="{0E0B5DDC-0B26-44AD-A009-905F1D0F114D}"/>
+                  <a16:creationId xmlns:a16="http://schemas.microsoft.com/office/drawing/2014/main" xmlns="" id="{0E0B5DDC-0B26-44AD-A009-905F1D0F114D}"/>
                 </a:ext>
               </a:extLst>
             </p:cNvPr>
@@ -8459,7 +11518,7 @@
           <p:cNvPr id="20" name="Group 19">
             <a:extLst>
               <a:ext uri="{FF2B5EF4-FFF2-40B4-BE49-F238E27FC236}">
-                <a16:creationId xmlns:a16="http://schemas.microsoft.com/office/drawing/2014/main" id="{5F8E1F85-0B44-4BEA-9DD9-BFA58DC49EA7}"/>
+                <a16:creationId xmlns:a16="http://schemas.microsoft.com/office/drawing/2014/main" xmlns="" id="{5F8E1F85-0B44-4BEA-9DD9-BFA58DC49EA7}"/>
               </a:ext>
             </a:extLst>
           </p:cNvPr>
@@ -8479,7 +11538,7 @@
             <p:cNvPr id="14" name="Picture 13">
               <a:extLst>
                 <a:ext uri="{FF2B5EF4-FFF2-40B4-BE49-F238E27FC236}">
-                  <a16:creationId xmlns:a16="http://schemas.microsoft.com/office/drawing/2014/main" id="{CE985408-ED77-43A1-8196-2B7874881DA5}"/>
+                  <a16:creationId xmlns:a16="http://schemas.microsoft.com/office/drawing/2014/main" xmlns="" id="{CE985408-ED77-43A1-8196-2B7874881DA5}"/>
                 </a:ext>
               </a:extLst>
             </p:cNvPr>
@@ -8509,7 +11568,7 @@
             <p:cNvPr id="19" name="TextBox 18">
               <a:extLst>
                 <a:ext uri="{FF2B5EF4-FFF2-40B4-BE49-F238E27FC236}">
-                  <a16:creationId xmlns:a16="http://schemas.microsoft.com/office/drawing/2014/main" id="{F645C549-D39D-480E-BE61-BB0E428A8B22}"/>
+                  <a16:creationId xmlns:a16="http://schemas.microsoft.com/office/drawing/2014/main" xmlns="" id="{F645C549-D39D-480E-BE61-BB0E428A8B22}"/>
                 </a:ext>
               </a:extLst>
             </p:cNvPr>
@@ -8545,7 +11604,7 @@
           <p:cNvPr id="23" name="Group 22">
             <a:extLst>
               <a:ext uri="{FF2B5EF4-FFF2-40B4-BE49-F238E27FC236}">
-                <a16:creationId xmlns:a16="http://schemas.microsoft.com/office/drawing/2014/main" id="{A8B2F0B9-CCC7-45E6-A959-033076974A32}"/>
+                <a16:creationId xmlns:a16="http://schemas.microsoft.com/office/drawing/2014/main" xmlns="" id="{A8B2F0B9-CCC7-45E6-A959-033076974A32}"/>
               </a:ext>
             </a:extLst>
           </p:cNvPr>
@@ -8565,7 +11624,7 @@
             <p:cNvPr id="21" name="Picture 20">
               <a:extLst>
                 <a:ext uri="{FF2B5EF4-FFF2-40B4-BE49-F238E27FC236}">
-                  <a16:creationId xmlns:a16="http://schemas.microsoft.com/office/drawing/2014/main" id="{C035B01E-4850-40E7-8BE1-92D6193D48CC}"/>
+                  <a16:creationId xmlns:a16="http://schemas.microsoft.com/office/drawing/2014/main" xmlns="" id="{C035B01E-4850-40E7-8BE1-92D6193D48CC}"/>
                 </a:ext>
               </a:extLst>
             </p:cNvPr>
@@ -8595,7 +11654,7 @@
             <p:cNvPr id="22" name="TextBox 21">
               <a:extLst>
                 <a:ext uri="{FF2B5EF4-FFF2-40B4-BE49-F238E27FC236}">
-                  <a16:creationId xmlns:a16="http://schemas.microsoft.com/office/drawing/2014/main" id="{5C6C23F6-2C92-441C-A726-5643000C365D}"/>
+                  <a16:creationId xmlns:a16="http://schemas.microsoft.com/office/drawing/2014/main" xmlns="" id="{5C6C23F6-2C92-441C-A726-5643000C365D}"/>
                 </a:ext>
               </a:extLst>
             </p:cNvPr>
@@ -8652,6 +11711,13 @@
   <p:clrMapOvr>
     <a:masterClrMapping/>
   </p:clrMapOvr>
+  <p:timing>
+    <p:tnLst>
+      <p:par>
+        <p:cTn id="1" dur="indefinite" restart="never" nodeType="tmRoot"/>
+      </p:par>
+    </p:tnLst>
+  </p:timing>
 </p:sld>
 </file>
 
@@ -8677,7 +11743,7 @@
           <p:cNvPr id="2" name="Picture 1">
             <a:extLst>
               <a:ext uri="{FF2B5EF4-FFF2-40B4-BE49-F238E27FC236}">
-                <a16:creationId xmlns:a16="http://schemas.microsoft.com/office/drawing/2014/main" id="{FA2C4E8D-88A9-4982-AD44-E3C32980898D}"/>
+                <a16:creationId xmlns:a16="http://schemas.microsoft.com/office/drawing/2014/main" xmlns="" id="{FA2C4E8D-88A9-4982-AD44-E3C32980898D}"/>
               </a:ext>
             </a:extLst>
           </p:cNvPr>
@@ -8738,7 +11804,7 @@
           <p:cNvPr id="18" name="Picture 17">
             <a:extLst>
               <a:ext uri="{FF2B5EF4-FFF2-40B4-BE49-F238E27FC236}">
-                <a16:creationId xmlns:a16="http://schemas.microsoft.com/office/drawing/2014/main" id="{7B14780C-05B5-4064-98BC-EDE59F95C3CE}"/>
+                <a16:creationId xmlns:a16="http://schemas.microsoft.com/office/drawing/2014/main" xmlns="" id="{7B14780C-05B5-4064-98BC-EDE59F95C3CE}"/>
               </a:ext>
             </a:extLst>
           </p:cNvPr>
@@ -8768,7 +11834,7 @@
           <p:cNvPr id="24" name="TextBox 23">
             <a:extLst>
               <a:ext uri="{FF2B5EF4-FFF2-40B4-BE49-F238E27FC236}">
-                <a16:creationId xmlns:a16="http://schemas.microsoft.com/office/drawing/2014/main" id="{352735D2-B519-4245-B759-AFCF7DB17E05}"/>
+                <a16:creationId xmlns:a16="http://schemas.microsoft.com/office/drawing/2014/main" xmlns="" id="{352735D2-B519-4245-B759-AFCF7DB17E05}"/>
               </a:ext>
             </a:extLst>
           </p:cNvPr>
@@ -8803,7 +11869,7 @@
           <p:cNvPr id="27" name="Picture 26">
             <a:extLst>
               <a:ext uri="{FF2B5EF4-FFF2-40B4-BE49-F238E27FC236}">
-                <a16:creationId xmlns:a16="http://schemas.microsoft.com/office/drawing/2014/main" id="{971C2314-FF2F-4D6A-9F1C-3FF2CAE0BECA}"/>
+                <a16:creationId xmlns:a16="http://schemas.microsoft.com/office/drawing/2014/main" xmlns="" id="{971C2314-FF2F-4D6A-9F1C-3FF2CAE0BECA}"/>
               </a:ext>
             </a:extLst>
           </p:cNvPr>
@@ -8833,7 +11899,7 @@
           <p:cNvPr id="17" name="Group 16">
             <a:extLst>
               <a:ext uri="{FF2B5EF4-FFF2-40B4-BE49-F238E27FC236}">
-                <a16:creationId xmlns:a16="http://schemas.microsoft.com/office/drawing/2014/main" id="{F595B657-D27F-469C-B756-7907EAE774E4}"/>
+                <a16:creationId xmlns:a16="http://schemas.microsoft.com/office/drawing/2014/main" xmlns="" id="{F595B657-D27F-469C-B756-7907EAE774E4}"/>
               </a:ext>
             </a:extLst>
           </p:cNvPr>
@@ -8853,7 +11919,7 @@
             <p:cNvPr id="6" name="Straight Arrow Connector 5">
               <a:extLst>
                 <a:ext uri="{FF2B5EF4-FFF2-40B4-BE49-F238E27FC236}">
-                  <a16:creationId xmlns:a16="http://schemas.microsoft.com/office/drawing/2014/main" id="{DCDC6391-64BF-4E57-B6A4-BB0889D4771A}"/>
+                  <a16:creationId xmlns:a16="http://schemas.microsoft.com/office/drawing/2014/main" xmlns="" id="{DCDC6391-64BF-4E57-B6A4-BB0889D4771A}"/>
                 </a:ext>
               </a:extLst>
             </p:cNvPr>
@@ -8894,7 +11960,7 @@
             <p:cNvPr id="28" name="TextBox 27">
               <a:extLst>
                 <a:ext uri="{FF2B5EF4-FFF2-40B4-BE49-F238E27FC236}">
-                  <a16:creationId xmlns:a16="http://schemas.microsoft.com/office/drawing/2014/main" id="{10068EB0-2206-437D-98CB-09A9B4A4577B}"/>
+                  <a16:creationId xmlns:a16="http://schemas.microsoft.com/office/drawing/2014/main" xmlns="" id="{10068EB0-2206-437D-98CB-09A9B4A4577B}"/>
                 </a:ext>
               </a:extLst>
             </p:cNvPr>
@@ -8930,7 +11996,7 @@
           <p:cNvPr id="29" name="TextBox 28">
             <a:extLst>
               <a:ext uri="{FF2B5EF4-FFF2-40B4-BE49-F238E27FC236}">
-                <a16:creationId xmlns:a16="http://schemas.microsoft.com/office/drawing/2014/main" id="{87571D1D-4E5F-4D3D-87CC-977A31C1318E}"/>
+                <a16:creationId xmlns:a16="http://schemas.microsoft.com/office/drawing/2014/main" xmlns="" id="{87571D1D-4E5F-4D3D-87CC-977A31C1318E}"/>
               </a:ext>
             </a:extLst>
           </p:cNvPr>
@@ -9061,6 +12127,13 @@
   <p:clrMapOvr>
     <a:masterClrMapping/>
   </p:clrMapOvr>
+  <p:timing>
+    <p:tnLst>
+      <p:par>
+        <p:cTn id="1" dur="indefinite" restart="never" nodeType="tmRoot"/>
+      </p:par>
+    </p:tnLst>
+  </p:timing>
 </p:sld>
 </file>
 
@@ -9086,7 +12159,7 @@
           <p:cNvPr id="2" name="Picture 1">
             <a:extLst>
               <a:ext uri="{FF2B5EF4-FFF2-40B4-BE49-F238E27FC236}">
-                <a16:creationId xmlns:a16="http://schemas.microsoft.com/office/drawing/2014/main" id="{FA2C4E8D-88A9-4982-AD44-E3C32980898D}"/>
+                <a16:creationId xmlns:a16="http://schemas.microsoft.com/office/drawing/2014/main" xmlns="" id="{FA2C4E8D-88A9-4982-AD44-E3C32980898D}"/>
               </a:ext>
             </a:extLst>
           </p:cNvPr>
@@ -9147,7 +12220,7 @@
           <p:cNvPr id="18" name="Picture 17">
             <a:extLst>
               <a:ext uri="{FF2B5EF4-FFF2-40B4-BE49-F238E27FC236}">
-                <a16:creationId xmlns:a16="http://schemas.microsoft.com/office/drawing/2014/main" id="{7B14780C-05B5-4064-98BC-EDE59F95C3CE}"/>
+                <a16:creationId xmlns:a16="http://schemas.microsoft.com/office/drawing/2014/main" xmlns="" id="{7B14780C-05B5-4064-98BC-EDE59F95C3CE}"/>
               </a:ext>
             </a:extLst>
           </p:cNvPr>
@@ -9177,7 +12250,7 @@
           <p:cNvPr id="24" name="TextBox 23">
             <a:extLst>
               <a:ext uri="{FF2B5EF4-FFF2-40B4-BE49-F238E27FC236}">
-                <a16:creationId xmlns:a16="http://schemas.microsoft.com/office/drawing/2014/main" id="{352735D2-B519-4245-B759-AFCF7DB17E05}"/>
+                <a16:creationId xmlns:a16="http://schemas.microsoft.com/office/drawing/2014/main" xmlns="" id="{352735D2-B519-4245-B759-AFCF7DB17E05}"/>
               </a:ext>
             </a:extLst>
           </p:cNvPr>
@@ -9212,7 +12285,7 @@
           <p:cNvPr id="27" name="Picture 26">
             <a:extLst>
               <a:ext uri="{FF2B5EF4-FFF2-40B4-BE49-F238E27FC236}">
-                <a16:creationId xmlns:a16="http://schemas.microsoft.com/office/drawing/2014/main" id="{971C2314-FF2F-4D6A-9F1C-3FF2CAE0BECA}"/>
+                <a16:creationId xmlns:a16="http://schemas.microsoft.com/office/drawing/2014/main" xmlns="" id="{971C2314-FF2F-4D6A-9F1C-3FF2CAE0BECA}"/>
               </a:ext>
             </a:extLst>
           </p:cNvPr>
@@ -9242,7 +12315,7 @@
           <p:cNvPr id="17" name="Group 16">
             <a:extLst>
               <a:ext uri="{FF2B5EF4-FFF2-40B4-BE49-F238E27FC236}">
-                <a16:creationId xmlns:a16="http://schemas.microsoft.com/office/drawing/2014/main" id="{F595B657-D27F-469C-B756-7907EAE774E4}"/>
+                <a16:creationId xmlns:a16="http://schemas.microsoft.com/office/drawing/2014/main" xmlns="" id="{F595B657-D27F-469C-B756-7907EAE774E4}"/>
               </a:ext>
             </a:extLst>
           </p:cNvPr>
@@ -9262,7 +12335,7 @@
             <p:cNvPr id="6" name="Straight Arrow Connector 5">
               <a:extLst>
                 <a:ext uri="{FF2B5EF4-FFF2-40B4-BE49-F238E27FC236}">
-                  <a16:creationId xmlns:a16="http://schemas.microsoft.com/office/drawing/2014/main" id="{DCDC6391-64BF-4E57-B6A4-BB0889D4771A}"/>
+                  <a16:creationId xmlns:a16="http://schemas.microsoft.com/office/drawing/2014/main" xmlns="" id="{DCDC6391-64BF-4E57-B6A4-BB0889D4771A}"/>
                 </a:ext>
               </a:extLst>
             </p:cNvPr>
@@ -9303,7 +12376,7 @@
             <p:cNvPr id="28" name="TextBox 27">
               <a:extLst>
                 <a:ext uri="{FF2B5EF4-FFF2-40B4-BE49-F238E27FC236}">
-                  <a16:creationId xmlns:a16="http://schemas.microsoft.com/office/drawing/2014/main" id="{10068EB0-2206-437D-98CB-09A9B4A4577B}"/>
+                  <a16:creationId xmlns:a16="http://schemas.microsoft.com/office/drawing/2014/main" xmlns="" id="{10068EB0-2206-437D-98CB-09A9B4A4577B}"/>
                 </a:ext>
               </a:extLst>
             </p:cNvPr>
@@ -9339,7 +12412,7 @@
           <p:cNvPr id="29" name="TextBox 28">
             <a:extLst>
               <a:ext uri="{FF2B5EF4-FFF2-40B4-BE49-F238E27FC236}">
-                <a16:creationId xmlns:a16="http://schemas.microsoft.com/office/drawing/2014/main" id="{87571D1D-4E5F-4D3D-87CC-977A31C1318E}"/>
+                <a16:creationId xmlns:a16="http://schemas.microsoft.com/office/drawing/2014/main" xmlns="" id="{87571D1D-4E5F-4D3D-87CC-977A31C1318E}"/>
               </a:ext>
             </a:extLst>
           </p:cNvPr>
@@ -9410,7 +12483,7 @@
           <p:cNvPr id="3" name="Picture 2">
             <a:extLst>
               <a:ext uri="{FF2B5EF4-FFF2-40B4-BE49-F238E27FC236}">
-                <a16:creationId xmlns:a16="http://schemas.microsoft.com/office/drawing/2014/main" id="{20AEE5B8-87C8-425E-A097-E3AD204CC044}"/>
+                <a16:creationId xmlns:a16="http://schemas.microsoft.com/office/drawing/2014/main" xmlns="" id="{20AEE5B8-87C8-425E-A097-E3AD204CC044}"/>
               </a:ext>
             </a:extLst>
           </p:cNvPr>
@@ -9440,7 +12513,7 @@
           <p:cNvPr id="4" name="Picture 3">
             <a:extLst>
               <a:ext uri="{FF2B5EF4-FFF2-40B4-BE49-F238E27FC236}">
-                <a16:creationId xmlns:a16="http://schemas.microsoft.com/office/drawing/2014/main" id="{87AB2EE5-9F43-418E-B096-B07AB5150B34}"/>
+                <a16:creationId xmlns:a16="http://schemas.microsoft.com/office/drawing/2014/main" xmlns="" id="{87AB2EE5-9F43-418E-B096-B07AB5150B34}"/>
               </a:ext>
             </a:extLst>
           </p:cNvPr>
@@ -9470,7 +12543,7 @@
           <p:cNvPr id="13" name="TextBox 12">
             <a:extLst>
               <a:ext uri="{FF2B5EF4-FFF2-40B4-BE49-F238E27FC236}">
-                <a16:creationId xmlns:a16="http://schemas.microsoft.com/office/drawing/2014/main" id="{C3E5A0C5-961F-43CF-823D-6860BD257ED8}"/>
+                <a16:creationId xmlns:a16="http://schemas.microsoft.com/office/drawing/2014/main" xmlns="" id="{C3E5A0C5-961F-43CF-823D-6860BD257ED8}"/>
               </a:ext>
             </a:extLst>
           </p:cNvPr>
@@ -9510,6 +12583,13 @@
   <p:clrMapOvr>
     <a:masterClrMapping/>
   </p:clrMapOvr>
+  <p:timing>
+    <p:tnLst>
+      <p:par>
+        <p:cTn id="1" dur="indefinite" restart="never" nodeType="tmRoot"/>
+      </p:par>
+    </p:tnLst>
+  </p:timing>
 </p:sld>
 </file>
 
@@ -9535,7 +12615,7 @@
           <p:cNvPr id="2" name="Picture 1">
             <a:extLst>
               <a:ext uri="{FF2B5EF4-FFF2-40B4-BE49-F238E27FC236}">
-                <a16:creationId xmlns:a16="http://schemas.microsoft.com/office/drawing/2014/main" id="{FA2C4E8D-88A9-4982-AD44-E3C32980898D}"/>
+                <a16:creationId xmlns:a16="http://schemas.microsoft.com/office/drawing/2014/main" xmlns="" id="{FA2C4E8D-88A9-4982-AD44-E3C32980898D}"/>
               </a:ext>
             </a:extLst>
           </p:cNvPr>
@@ -9596,7 +12676,7 @@
           <p:cNvPr id="18" name="Picture 17">
             <a:extLst>
               <a:ext uri="{FF2B5EF4-FFF2-40B4-BE49-F238E27FC236}">
-                <a16:creationId xmlns:a16="http://schemas.microsoft.com/office/drawing/2014/main" id="{7B14780C-05B5-4064-98BC-EDE59F95C3CE}"/>
+                <a16:creationId xmlns:a16="http://schemas.microsoft.com/office/drawing/2014/main" xmlns="" id="{7B14780C-05B5-4064-98BC-EDE59F95C3CE}"/>
               </a:ext>
             </a:extLst>
           </p:cNvPr>
@@ -9626,7 +12706,7 @@
           <p:cNvPr id="24" name="TextBox 23">
             <a:extLst>
               <a:ext uri="{FF2B5EF4-FFF2-40B4-BE49-F238E27FC236}">
-                <a16:creationId xmlns:a16="http://schemas.microsoft.com/office/drawing/2014/main" id="{352735D2-B519-4245-B759-AFCF7DB17E05}"/>
+                <a16:creationId xmlns:a16="http://schemas.microsoft.com/office/drawing/2014/main" xmlns="" id="{352735D2-B519-4245-B759-AFCF7DB17E05}"/>
               </a:ext>
             </a:extLst>
           </p:cNvPr>
@@ -9661,7 +12741,7 @@
           <p:cNvPr id="27" name="Picture 26">
             <a:extLst>
               <a:ext uri="{FF2B5EF4-FFF2-40B4-BE49-F238E27FC236}">
-                <a16:creationId xmlns:a16="http://schemas.microsoft.com/office/drawing/2014/main" id="{971C2314-FF2F-4D6A-9F1C-3FF2CAE0BECA}"/>
+                <a16:creationId xmlns:a16="http://schemas.microsoft.com/office/drawing/2014/main" xmlns="" id="{971C2314-FF2F-4D6A-9F1C-3FF2CAE0BECA}"/>
               </a:ext>
             </a:extLst>
           </p:cNvPr>
@@ -9691,7 +12771,7 @@
           <p:cNvPr id="17" name="Group 16">
             <a:extLst>
               <a:ext uri="{FF2B5EF4-FFF2-40B4-BE49-F238E27FC236}">
-                <a16:creationId xmlns:a16="http://schemas.microsoft.com/office/drawing/2014/main" id="{F595B657-D27F-469C-B756-7907EAE774E4}"/>
+                <a16:creationId xmlns:a16="http://schemas.microsoft.com/office/drawing/2014/main" xmlns="" id="{F595B657-D27F-469C-B756-7907EAE774E4}"/>
               </a:ext>
             </a:extLst>
           </p:cNvPr>
@@ -9711,7 +12791,7 @@
             <p:cNvPr id="6" name="Straight Arrow Connector 5">
               <a:extLst>
                 <a:ext uri="{FF2B5EF4-FFF2-40B4-BE49-F238E27FC236}">
-                  <a16:creationId xmlns:a16="http://schemas.microsoft.com/office/drawing/2014/main" id="{DCDC6391-64BF-4E57-B6A4-BB0889D4771A}"/>
+                  <a16:creationId xmlns:a16="http://schemas.microsoft.com/office/drawing/2014/main" xmlns="" id="{DCDC6391-64BF-4E57-B6A4-BB0889D4771A}"/>
                 </a:ext>
               </a:extLst>
             </p:cNvPr>
@@ -9752,7 +12832,7 @@
             <p:cNvPr id="28" name="TextBox 27">
               <a:extLst>
                 <a:ext uri="{FF2B5EF4-FFF2-40B4-BE49-F238E27FC236}">
-                  <a16:creationId xmlns:a16="http://schemas.microsoft.com/office/drawing/2014/main" id="{10068EB0-2206-437D-98CB-09A9B4A4577B}"/>
+                  <a16:creationId xmlns:a16="http://schemas.microsoft.com/office/drawing/2014/main" xmlns="" id="{10068EB0-2206-437D-98CB-09A9B4A4577B}"/>
                 </a:ext>
               </a:extLst>
             </p:cNvPr>
@@ -9788,7 +12868,7 @@
           <p:cNvPr id="30" name="TextBox 29">
             <a:extLst>
               <a:ext uri="{FF2B5EF4-FFF2-40B4-BE49-F238E27FC236}">
-                <a16:creationId xmlns:a16="http://schemas.microsoft.com/office/drawing/2014/main" id="{4A9E47C4-334E-4D8A-B3F5-360512E1D868}"/>
+                <a16:creationId xmlns:a16="http://schemas.microsoft.com/office/drawing/2014/main" xmlns="" id="{4A9E47C4-334E-4D8A-B3F5-360512E1D868}"/>
               </a:ext>
             </a:extLst>
           </p:cNvPr>
@@ -9826,7 +12906,7 @@
           <p:cNvPr id="31" name="Picture 30">
             <a:extLst>
               <a:ext uri="{FF2B5EF4-FFF2-40B4-BE49-F238E27FC236}">
-                <a16:creationId xmlns:a16="http://schemas.microsoft.com/office/drawing/2014/main" id="{1896EA87-44C3-4218-BEBF-14204058CDFB}"/>
+                <a16:creationId xmlns:a16="http://schemas.microsoft.com/office/drawing/2014/main" xmlns="" id="{1896EA87-44C3-4218-BEBF-14204058CDFB}"/>
               </a:ext>
             </a:extLst>
           </p:cNvPr>
@@ -9863,7 +12943,7 @@
           <p:cNvPr id="36" name="TextBox 35">
             <a:extLst>
               <a:ext uri="{FF2B5EF4-FFF2-40B4-BE49-F238E27FC236}">
-                <a16:creationId xmlns:a16="http://schemas.microsoft.com/office/drawing/2014/main" id="{0638F538-294B-4268-BC66-31464DC47C9A}"/>
+                <a16:creationId xmlns:a16="http://schemas.microsoft.com/office/drawing/2014/main" xmlns="" id="{0638F538-294B-4268-BC66-31464DC47C9A}"/>
               </a:ext>
             </a:extLst>
           </p:cNvPr>
@@ -9910,7 +12990,7 @@
           <p:cNvPr id="37" name="TextBox 36">
             <a:extLst>
               <a:ext uri="{FF2B5EF4-FFF2-40B4-BE49-F238E27FC236}">
-                <a16:creationId xmlns:a16="http://schemas.microsoft.com/office/drawing/2014/main" id="{F47100AD-9BBF-48F9-B64D-3BE14425A4AE}"/>
+                <a16:creationId xmlns:a16="http://schemas.microsoft.com/office/drawing/2014/main" xmlns="" id="{F47100AD-9BBF-48F9-B64D-3BE14425A4AE}"/>
               </a:ext>
             </a:extLst>
           </p:cNvPr>
@@ -9945,7 +13025,7 @@
           <p:cNvPr id="38" name="Picture 37">
             <a:extLst>
               <a:ext uri="{FF2B5EF4-FFF2-40B4-BE49-F238E27FC236}">
-                <a16:creationId xmlns:a16="http://schemas.microsoft.com/office/drawing/2014/main" id="{D2B6003A-005B-4B0E-935E-073A39DAA909}"/>
+                <a16:creationId xmlns:a16="http://schemas.microsoft.com/office/drawing/2014/main" xmlns="" id="{D2B6003A-005B-4B0E-935E-073A39DAA909}"/>
               </a:ext>
             </a:extLst>
           </p:cNvPr>
@@ -9982,7 +13062,7 @@
           <p:cNvPr id="44" name="Straight Connector 43">
             <a:extLst>
               <a:ext uri="{FF2B5EF4-FFF2-40B4-BE49-F238E27FC236}">
-                <a16:creationId xmlns:a16="http://schemas.microsoft.com/office/drawing/2014/main" id="{76991DC1-3360-425C-B122-6C0DE7E7EA31}"/>
+                <a16:creationId xmlns:a16="http://schemas.microsoft.com/office/drawing/2014/main" xmlns="" id="{76991DC1-3360-425C-B122-6C0DE7E7EA31}"/>
               </a:ext>
             </a:extLst>
           </p:cNvPr>
@@ -10019,7 +13099,7 @@
           <p:cNvPr id="48" name="TextBox 47">
             <a:extLst>
               <a:ext uri="{FF2B5EF4-FFF2-40B4-BE49-F238E27FC236}">
-                <a16:creationId xmlns:a16="http://schemas.microsoft.com/office/drawing/2014/main" id="{012D5DB0-5201-4029-9D24-26FF147F3304}"/>
+                <a16:creationId xmlns:a16="http://schemas.microsoft.com/office/drawing/2014/main" xmlns="" id="{012D5DB0-5201-4029-9D24-26FF147F3304}"/>
               </a:ext>
             </a:extLst>
           </p:cNvPr>
@@ -10074,7 +13154,7 @@
           <p:cNvPr id="49" name="Picture 48">
             <a:extLst>
               <a:ext uri="{FF2B5EF4-FFF2-40B4-BE49-F238E27FC236}">
-                <a16:creationId xmlns:a16="http://schemas.microsoft.com/office/drawing/2014/main" id="{16C8827A-3D3F-4873-8A40-421FB263BAEA}"/>
+                <a16:creationId xmlns:a16="http://schemas.microsoft.com/office/drawing/2014/main" xmlns="" id="{16C8827A-3D3F-4873-8A40-421FB263BAEA}"/>
               </a:ext>
             </a:extLst>
           </p:cNvPr>
@@ -10104,7 +13184,7 @@
           <p:cNvPr id="50" name="TextBox 49">
             <a:extLst>
               <a:ext uri="{FF2B5EF4-FFF2-40B4-BE49-F238E27FC236}">
-                <a16:creationId xmlns:a16="http://schemas.microsoft.com/office/drawing/2014/main" id="{6D076724-7B73-466A-AA32-96ED7FE3C00F}"/>
+                <a16:creationId xmlns:a16="http://schemas.microsoft.com/office/drawing/2014/main" xmlns="" id="{6D076724-7B73-466A-AA32-96ED7FE3C00F}"/>
               </a:ext>
             </a:extLst>
           </p:cNvPr>
@@ -10152,6 +13232,13 @@
   <p:clrMapOvr>
     <a:masterClrMapping/>
   </p:clrMapOvr>
+  <p:timing>
+    <p:tnLst>
+      <p:par>
+        <p:cTn id="1" dur="indefinite" restart="never" nodeType="tmRoot"/>
+      </p:par>
+    </p:tnLst>
+  </p:timing>
 </p:sld>
 </file>
 

</xml_diff>